<commit_message>
- added additional notes from the meeting;
</commit_message>
<xml_diff>
--- a/meetings/2012-03-17/meeting-2.pptx
+++ b/meetings/2012-03-17/meeting-2.pptx
@@ -13,21 +13,25 @@
     <p:sldId id="270" r:id="rId7"/>
     <p:sldId id="269" r:id="rId8"/>
     <p:sldId id="268" r:id="rId9"/>
-    <p:sldId id="267" r:id="rId10"/>
-    <p:sldId id="271" r:id="rId11"/>
-    <p:sldId id="274" r:id="rId12"/>
-    <p:sldId id="278" r:id="rId13"/>
-    <p:sldId id="275" r:id="rId14"/>
-    <p:sldId id="281" r:id="rId15"/>
-    <p:sldId id="280" r:id="rId16"/>
-    <p:sldId id="284" r:id="rId17"/>
-    <p:sldId id="283" r:id="rId18"/>
-    <p:sldId id="285" r:id="rId19"/>
-    <p:sldId id="279" r:id="rId20"/>
-    <p:sldId id="277" r:id="rId21"/>
-    <p:sldId id="272" r:id="rId22"/>
-    <p:sldId id="286" r:id="rId23"/>
-    <p:sldId id="282" r:id="rId24"/>
+    <p:sldId id="289" r:id="rId10"/>
+    <p:sldId id="267" r:id="rId11"/>
+    <p:sldId id="271" r:id="rId12"/>
+    <p:sldId id="274" r:id="rId13"/>
+    <p:sldId id="278" r:id="rId14"/>
+    <p:sldId id="275" r:id="rId15"/>
+    <p:sldId id="281" r:id="rId16"/>
+    <p:sldId id="280" r:id="rId17"/>
+    <p:sldId id="284" r:id="rId18"/>
+    <p:sldId id="283" r:id="rId19"/>
+    <p:sldId id="285" r:id="rId20"/>
+    <p:sldId id="279" r:id="rId21"/>
+    <p:sldId id="277" r:id="rId22"/>
+    <p:sldId id="272" r:id="rId23"/>
+    <p:sldId id="286" r:id="rId24"/>
+    <p:sldId id="288" r:id="rId25"/>
+    <p:sldId id="290" r:id="rId26"/>
+    <p:sldId id="291" r:id="rId27"/>
+    <p:sldId id="282" r:id="rId28"/>
   </p:sldIdLst>
   <p:sldSz cx="9144000" cy="6858000" type="screen4x3"/>
   <p:notesSz cx="6858000" cy="9144000"/>
@@ -7986,7 +7990,7 @@
           <a:p>
             <a:fld id="{9127F9E0-0A34-41D2-A749-492CDAC5D341}" type="datetimeFigureOut">
               <a:rPr lang="en-GB" smtClean="0"/>
-              <a:t>18/03/2012</a:t>
+              <a:t>19/03/2012</a:t>
             </a:fld>
             <a:endParaRPr lang="en-GB"/>
           </a:p>
@@ -8156,7 +8160,7 @@
           <a:p>
             <a:fld id="{9127F9E0-0A34-41D2-A749-492CDAC5D341}" type="datetimeFigureOut">
               <a:rPr lang="en-GB" smtClean="0"/>
-              <a:t>18/03/2012</a:t>
+              <a:t>19/03/2012</a:t>
             </a:fld>
             <a:endParaRPr lang="en-GB"/>
           </a:p>
@@ -8336,7 +8340,7 @@
           <a:p>
             <a:fld id="{9127F9E0-0A34-41D2-A749-492CDAC5D341}" type="datetimeFigureOut">
               <a:rPr lang="en-GB" smtClean="0"/>
-              <a:t>18/03/2012</a:t>
+              <a:t>19/03/2012</a:t>
             </a:fld>
             <a:endParaRPr lang="en-GB"/>
           </a:p>
@@ -8506,7 +8510,7 @@
           <a:p>
             <a:fld id="{9127F9E0-0A34-41D2-A749-492CDAC5D341}" type="datetimeFigureOut">
               <a:rPr lang="en-GB" smtClean="0"/>
-              <a:t>18/03/2012</a:t>
+              <a:t>19/03/2012</a:t>
             </a:fld>
             <a:endParaRPr lang="en-GB"/>
           </a:p>
@@ -8752,7 +8756,7 @@
           <a:p>
             <a:fld id="{9127F9E0-0A34-41D2-A749-492CDAC5D341}" type="datetimeFigureOut">
               <a:rPr lang="en-GB" smtClean="0"/>
-              <a:t>18/03/2012</a:t>
+              <a:t>19/03/2012</a:t>
             </a:fld>
             <a:endParaRPr lang="en-GB"/>
           </a:p>
@@ -9040,7 +9044,7 @@
           <a:p>
             <a:fld id="{9127F9E0-0A34-41D2-A749-492CDAC5D341}" type="datetimeFigureOut">
               <a:rPr lang="en-GB" smtClean="0"/>
-              <a:t>18/03/2012</a:t>
+              <a:t>19/03/2012</a:t>
             </a:fld>
             <a:endParaRPr lang="en-GB"/>
           </a:p>
@@ -9462,7 +9466,7 @@
           <a:p>
             <a:fld id="{9127F9E0-0A34-41D2-A749-492CDAC5D341}" type="datetimeFigureOut">
               <a:rPr lang="en-GB" smtClean="0"/>
-              <a:t>18/03/2012</a:t>
+              <a:t>19/03/2012</a:t>
             </a:fld>
             <a:endParaRPr lang="en-GB"/>
           </a:p>
@@ -9580,7 +9584,7 @@
           <a:p>
             <a:fld id="{9127F9E0-0A34-41D2-A749-492CDAC5D341}" type="datetimeFigureOut">
               <a:rPr lang="en-GB" smtClean="0"/>
-              <a:t>18/03/2012</a:t>
+              <a:t>19/03/2012</a:t>
             </a:fld>
             <a:endParaRPr lang="en-GB"/>
           </a:p>
@@ -9675,7 +9679,7 @@
           <a:p>
             <a:fld id="{9127F9E0-0A34-41D2-A749-492CDAC5D341}" type="datetimeFigureOut">
               <a:rPr lang="en-GB" smtClean="0"/>
-              <a:t>18/03/2012</a:t>
+              <a:t>19/03/2012</a:t>
             </a:fld>
             <a:endParaRPr lang="en-GB"/>
           </a:p>
@@ -9952,7 +9956,7 @@
           <a:p>
             <a:fld id="{9127F9E0-0A34-41D2-A749-492CDAC5D341}" type="datetimeFigureOut">
               <a:rPr lang="en-GB" smtClean="0"/>
-              <a:t>18/03/2012</a:t>
+              <a:t>19/03/2012</a:t>
             </a:fld>
             <a:endParaRPr lang="en-GB"/>
           </a:p>
@@ -10205,7 +10209,7 @@
           <a:p>
             <a:fld id="{9127F9E0-0A34-41D2-A749-492CDAC5D341}" type="datetimeFigureOut">
               <a:rPr lang="en-GB" smtClean="0"/>
-              <a:t>18/03/2012</a:t>
+              <a:t>19/03/2012</a:t>
             </a:fld>
             <a:endParaRPr lang="en-GB"/>
           </a:p>
@@ -10418,7 +10422,7 @@
           <a:p>
             <a:fld id="{9127F9E0-0A34-41D2-A749-492CDAC5D341}" type="datetimeFigureOut">
               <a:rPr lang="en-GB" smtClean="0"/>
-              <a:t>18/03/2012</a:t>
+              <a:t>19/03/2012</a:t>
             </a:fld>
             <a:endParaRPr lang="en-GB"/>
           </a:p>
@@ -10954,6 +10958,313 @@
           <a:p>
             <a:r>
               <a:rPr lang="bg-BG" dirty="0" smtClean="0"/>
+              <a:t>Организация</a:t>
+            </a:r>
+            <a:endParaRPr lang="en-GB" dirty="0"/>
+          </a:p>
+        </p:txBody>
+      </p:sp>
+      <p:sp>
+        <p:nvSpPr>
+          <p:cNvPr id="3" name="Content Placeholder 2"/>
+          <p:cNvSpPr>
+            <a:spLocks noGrp="1"/>
+          </p:cNvSpPr>
+          <p:nvPr>
+            <p:ph idx="1"/>
+          </p:nvPr>
+        </p:nvSpPr>
+        <p:spPr>
+          <a:xfrm>
+            <a:off x="683568" y="1600200"/>
+            <a:ext cx="8003232" cy="4525963"/>
+          </a:xfrm>
+        </p:spPr>
+        <p:txBody>
+          <a:bodyPr/>
+          <a:lstStyle/>
+          <a:p>
+            <a:pPr>
+              <a:buClr>
+                <a:schemeClr val="tx2">
+                  <a:lumMod val="75000"/>
+                </a:schemeClr>
+              </a:buClr>
+              <a:buFont typeface="Courier New" pitchFamily="49" charset="0"/>
+              <a:buChar char="o"/>
+            </a:pPr>
+            <a:r>
+              <a:rPr lang="bg-BG" dirty="0" smtClean="0"/>
+              <a:t>Нещо като </a:t>
+            </a:r>
+            <a:r>
+              <a:rPr lang="es-ES" dirty="0" err="1" smtClean="0"/>
+              <a:t>scrum</a:t>
+            </a:r>
+            <a:endParaRPr lang="es-ES" dirty="0" smtClean="0"/>
+          </a:p>
+          <a:p>
+            <a:pPr>
+              <a:buClr>
+                <a:schemeClr val="tx2">
+                  <a:lumMod val="75000"/>
+                </a:schemeClr>
+              </a:buClr>
+              <a:buFont typeface="Courier New" pitchFamily="49" charset="0"/>
+              <a:buChar char="o"/>
+            </a:pPr>
+            <a:r>
+              <a:rPr lang="bg-BG" dirty="0" smtClean="0"/>
+              <a:t>Кратки итерации/етапи</a:t>
+            </a:r>
+          </a:p>
+          <a:p>
+            <a:pPr>
+              <a:buClr>
+                <a:schemeClr val="tx2">
+                  <a:lumMod val="75000"/>
+                </a:schemeClr>
+              </a:buClr>
+              <a:buFont typeface="Courier New" pitchFamily="49" charset="0"/>
+              <a:buChar char="o"/>
+            </a:pPr>
+            <a:r>
+              <a:rPr lang="bg-BG" dirty="0" smtClean="0"/>
+              <a:t>Чести междинни проверки</a:t>
+            </a:r>
+          </a:p>
+          <a:p>
+            <a:pPr lvl="1">
+              <a:buClr>
+                <a:schemeClr val="tx2">
+                  <a:lumMod val="75000"/>
+                </a:schemeClr>
+              </a:buClr>
+              <a:buFont typeface="Courier New" pitchFamily="49" charset="0"/>
+              <a:buChar char="o"/>
+            </a:pPr>
+            <a:r>
+              <a:rPr lang="es-ES" dirty="0" err="1" smtClean="0"/>
+              <a:t>Commit</a:t>
+            </a:r>
+            <a:r>
+              <a:rPr lang="es-ES" dirty="0" smtClean="0"/>
+              <a:t> </a:t>
+            </a:r>
+            <a:r>
+              <a:rPr lang="es-ES" dirty="0" err="1" smtClean="0"/>
+              <a:t>early</a:t>
+            </a:r>
+            <a:r>
+              <a:rPr lang="es-ES" dirty="0" smtClean="0"/>
+              <a:t>, </a:t>
+            </a:r>
+            <a:r>
+              <a:rPr lang="es-ES" dirty="0" err="1" smtClean="0"/>
+              <a:t>commit</a:t>
+            </a:r>
+            <a:r>
+              <a:rPr lang="es-ES" dirty="0" smtClean="0"/>
+              <a:t> </a:t>
+            </a:r>
+            <a:r>
+              <a:rPr lang="es-ES" dirty="0" err="1" smtClean="0"/>
+              <a:t>often</a:t>
+            </a:r>
+            <a:endParaRPr lang="bg-BG" dirty="0" smtClean="0"/>
+          </a:p>
+          <a:p>
+            <a:pPr>
+              <a:buClr>
+                <a:schemeClr val="tx2">
+                  <a:lumMod val="75000"/>
+                </a:schemeClr>
+              </a:buClr>
+              <a:buFont typeface="Courier New" pitchFamily="49" charset="0"/>
+              <a:buChar char="o"/>
+            </a:pPr>
+            <a:r>
+              <a:rPr lang="bg-BG" dirty="0" smtClean="0"/>
+              <a:t>Етапи</a:t>
+            </a:r>
+          </a:p>
+          <a:p>
+            <a:pPr lvl="1">
+              <a:buClr>
+                <a:schemeClr val="tx2">
+                  <a:lumMod val="75000"/>
+                </a:schemeClr>
+              </a:buClr>
+              <a:buFont typeface="Courier New" pitchFamily="49" charset="0"/>
+              <a:buChar char="o"/>
+            </a:pPr>
+            <a:r>
+              <a:rPr lang="bg-BG" dirty="0" smtClean="0"/>
+              <a:t>Писане (2</a:t>
+            </a:r>
+            <a:r>
+              <a:rPr lang="en-US" dirty="0" smtClean="0"/>
+              <a:t>n+1)</a:t>
+            </a:r>
+            <a:endParaRPr lang="bg-BG" dirty="0" smtClean="0"/>
+          </a:p>
+          <a:p>
+            <a:pPr lvl="1">
+              <a:buClr>
+                <a:schemeClr val="tx2">
+                  <a:lumMod val="75000"/>
+                </a:schemeClr>
+              </a:buClr>
+              <a:buFont typeface="Courier New" pitchFamily="49" charset="0"/>
+              <a:buChar char="o"/>
+            </a:pPr>
+            <a:r>
+              <a:rPr lang="bg-BG" dirty="0" smtClean="0"/>
+              <a:t>Редакция</a:t>
+            </a:r>
+            <a:r>
+              <a:rPr lang="en-US" dirty="0" smtClean="0"/>
+              <a:t> (2n)</a:t>
+            </a:r>
+          </a:p>
+          <a:p>
+            <a:pPr>
+              <a:buClr>
+                <a:schemeClr val="tx2">
+                  <a:lumMod val="75000"/>
+                </a:schemeClr>
+              </a:buClr>
+              <a:buFont typeface="Courier New" pitchFamily="49" charset="0"/>
+              <a:buChar char="o"/>
+            </a:pPr>
+            <a:r>
+              <a:rPr lang="bg-BG" dirty="0" smtClean="0"/>
+              <a:t>Организаторска редакция</a:t>
+            </a:r>
+          </a:p>
+          <a:p>
+            <a:pPr>
+              <a:buClr>
+                <a:schemeClr val="tx2">
+                  <a:lumMod val="75000"/>
+                </a:schemeClr>
+              </a:buClr>
+              <a:buFont typeface="Courier New" pitchFamily="49" charset="0"/>
+              <a:buChar char="o"/>
+            </a:pPr>
+            <a:endParaRPr lang="en-GB" dirty="0"/>
+          </a:p>
+        </p:txBody>
+      </p:sp>
+      <p:sp>
+        <p:nvSpPr>
+          <p:cNvPr id="8" name="Round Diagonal Corner Rectangle 7"/>
+          <p:cNvSpPr/>
+          <p:nvPr/>
+        </p:nvSpPr>
+        <p:spPr>
+          <a:xfrm rot="10800000">
+            <a:off x="467544" y="260648"/>
+            <a:ext cx="8208912" cy="6264696"/>
+          </a:xfrm>
+          <a:prstGeom prst="round2DiagRect">
+            <a:avLst/>
+          </a:prstGeom>
+          <a:noFill/>
+          <a:ln>
+            <a:solidFill>
+              <a:schemeClr val="accent1">
+                <a:shade val="50000"/>
+              </a:schemeClr>
+            </a:solidFill>
+          </a:ln>
+          <a:effectLst>
+            <a:outerShdw blurRad="50800" dist="38100" dir="2700000" algn="tl" rotWithShape="0">
+              <a:prstClr val="black">
+                <a:alpha val="40000"/>
+              </a:prstClr>
+            </a:outerShdw>
+          </a:effectLst>
+        </p:spPr>
+        <p:style>
+          <a:lnRef idx="2">
+            <a:schemeClr val="accent1">
+              <a:shade val="50000"/>
+            </a:schemeClr>
+          </a:lnRef>
+          <a:fillRef idx="1">
+            <a:schemeClr val="accent1"/>
+          </a:fillRef>
+          <a:effectRef idx="0">
+            <a:schemeClr val="accent1"/>
+          </a:effectRef>
+          <a:fontRef idx="minor">
+            <a:schemeClr val="lt1"/>
+          </a:fontRef>
+        </p:style>
+        <p:txBody>
+          <a:bodyPr rtlCol="0" anchor="ctr"/>
+          <a:lstStyle/>
+          <a:p>
+            <a:pPr algn="ctr"/>
+            <a:endParaRPr lang="en-GB"/>
+          </a:p>
+        </p:txBody>
+      </p:sp>
+    </p:spTree>
+    <p:extLst>
+      <p:ext uri="{BB962C8B-B14F-4D97-AF65-F5344CB8AC3E}">
+        <p14:creationId xmlns:p14="http://schemas.microsoft.com/office/powerpoint/2010/main" val="1675421750"/>
+      </p:ext>
+    </p:extLst>
+  </p:cSld>
+  <p:clrMapOvr>
+    <a:masterClrMapping/>
+  </p:clrMapOvr>
+  <p:timing>
+    <p:tnLst>
+      <p:par>
+        <p:cTn id="1" dur="indefinite" restart="never" nodeType="tmRoot"/>
+      </p:par>
+    </p:tnLst>
+  </p:timing>
+</p:sld>
+</file>
+
+<file path=ppt/slides/slide11.xml><?xml version="1.0" encoding="utf-8"?>
+<p:sld xmlns:a="http://schemas.openxmlformats.org/drawingml/2006/main" xmlns:r="http://schemas.openxmlformats.org/officeDocument/2006/relationships" xmlns:p="http://schemas.openxmlformats.org/presentationml/2006/main">
+  <p:cSld>
+    <p:spTree>
+      <p:nvGrpSpPr>
+        <p:cNvPr id="1" name=""/>
+        <p:cNvGrpSpPr/>
+        <p:nvPr/>
+      </p:nvGrpSpPr>
+      <p:grpSpPr>
+        <a:xfrm>
+          <a:off x="0" y="0"/>
+          <a:ext cx="0" cy="0"/>
+          <a:chOff x="0" y="0"/>
+          <a:chExt cx="0" cy="0"/>
+        </a:xfrm>
+      </p:grpSpPr>
+      <p:sp>
+        <p:nvSpPr>
+          <p:cNvPr id="2" name="Title 1"/>
+          <p:cNvSpPr>
+            <a:spLocks noGrp="1"/>
+          </p:cNvSpPr>
+          <p:nvPr>
+            <p:ph type="title"/>
+          </p:nvPr>
+        </p:nvSpPr>
+        <p:spPr/>
+        <p:txBody>
+          <a:bodyPr/>
+          <a:lstStyle/>
+          <a:p>
+            <a:r>
+              <a:rPr lang="bg-BG" dirty="0" smtClean="0"/>
               <a:t>Писане (+ планиране)</a:t>
             </a:r>
             <a:endParaRPr lang="en-GB" dirty="0"/>
@@ -11326,7 +11637,7 @@
 </p:sld>
 </file>
 
-<file path=ppt/slides/slide11.xml><?xml version="1.0" encoding="utf-8"?>
+<file path=ppt/slides/slide12.xml><?xml version="1.0" encoding="utf-8"?>
 <p:sld xmlns:a="http://schemas.openxmlformats.org/drawingml/2006/main" xmlns:r="http://schemas.openxmlformats.org/officeDocument/2006/relationships" xmlns:p="http://schemas.openxmlformats.org/presentationml/2006/main">
   <p:cSld>
     <p:spTree>
@@ -11530,7 +11841,7 @@
 </p:sld>
 </file>
 
-<file path=ppt/slides/slide12.xml><?xml version="1.0" encoding="utf-8"?>
+<file path=ppt/slides/slide13.xml><?xml version="1.0" encoding="utf-8"?>
 <p:sld xmlns:a="http://schemas.openxmlformats.org/drawingml/2006/main" xmlns:r="http://schemas.openxmlformats.org/officeDocument/2006/relationships" xmlns:p="http://schemas.openxmlformats.org/presentationml/2006/main">
   <p:cSld>
     <p:spTree>
@@ -12175,7 +12486,7 @@
 </p:sld>
 </file>
 
-<file path=ppt/slides/slide13.xml><?xml version="1.0" encoding="utf-8"?>
+<file path=ppt/slides/slide14.xml><?xml version="1.0" encoding="utf-8"?>
 <p:sld xmlns:a="http://schemas.openxmlformats.org/drawingml/2006/main" xmlns:r="http://schemas.openxmlformats.org/officeDocument/2006/relationships" xmlns:p="http://schemas.openxmlformats.org/presentationml/2006/main">
   <p:cSld>
     <p:spTree>
@@ -12494,7 +12805,7 @@
 </p:sld>
 </file>
 
-<file path=ppt/slides/slide14.xml><?xml version="1.0" encoding="utf-8"?>
+<file path=ppt/slides/slide15.xml><?xml version="1.0" encoding="utf-8"?>
 <p:sld xmlns:a="http://schemas.openxmlformats.org/drawingml/2006/main" xmlns:r="http://schemas.openxmlformats.org/officeDocument/2006/relationships" xmlns:p="http://schemas.openxmlformats.org/presentationml/2006/main">
   <p:cSld>
     <p:spTree>
@@ -12806,7 +13117,7 @@
 </p:sld>
 </file>
 
-<file path=ppt/slides/slide15.xml><?xml version="1.0" encoding="utf-8"?>
+<file path=ppt/slides/slide16.xml><?xml version="1.0" encoding="utf-8"?>
 <p:sld xmlns:a="http://schemas.openxmlformats.org/drawingml/2006/main" xmlns:r="http://schemas.openxmlformats.org/officeDocument/2006/relationships" xmlns:p="http://schemas.openxmlformats.org/presentationml/2006/main">
   <p:cSld>
     <p:spTree>
@@ -13063,7 +13374,7 @@
 </p:sld>
 </file>
 
-<file path=ppt/slides/slide16.xml><?xml version="1.0" encoding="utf-8"?>
+<file path=ppt/slides/slide17.xml><?xml version="1.0" encoding="utf-8"?>
 <p:sld xmlns:a="http://schemas.openxmlformats.org/drawingml/2006/main" xmlns:r="http://schemas.openxmlformats.org/officeDocument/2006/relationships" xmlns:p="http://schemas.openxmlformats.org/presentationml/2006/main">
   <p:cSld>
     <p:spTree>
@@ -13430,7 +13741,7 @@
 </p:sld>
 </file>
 
-<file path=ppt/slides/slide17.xml><?xml version="1.0" encoding="utf-8"?>
+<file path=ppt/slides/slide18.xml><?xml version="1.0" encoding="utf-8"?>
 <p:sld xmlns:a="http://schemas.openxmlformats.org/drawingml/2006/main" xmlns:r="http://schemas.openxmlformats.org/officeDocument/2006/relationships" xmlns:p="http://schemas.openxmlformats.org/presentationml/2006/main">
   <p:cSld>
     <p:spTree>
@@ -13517,8 +13828,20 @@
               <a:buChar char="o"/>
             </a:pPr>
             <a:r>
+              <a:rPr lang="en-US" dirty="0" smtClean="0"/>
+              <a:t>24</a:t>
+            </a:r>
+            <a:r>
               <a:rPr lang="bg-BG" dirty="0" smtClean="0"/>
-              <a:t>17.03-18.03</a:t>
+              <a:t>.03-</a:t>
+            </a:r>
+            <a:r>
+              <a:rPr lang="en-US" dirty="0" smtClean="0"/>
+              <a:t>25</a:t>
+            </a:r>
+            <a:r>
+              <a:rPr lang="bg-BG" dirty="0" smtClean="0"/>
+              <a:t>.03</a:t>
             </a:r>
             <a:br>
               <a:rPr lang="bg-BG" dirty="0" smtClean="0"/>
@@ -13551,8 +13874,12 @@
               <a:buChar char="o"/>
             </a:pPr>
             <a:r>
+              <a:rPr lang="en-US" dirty="0" smtClean="0"/>
+              <a:t>26</a:t>
+            </a:r>
+            <a:r>
               <a:rPr lang="bg-BG" dirty="0" smtClean="0"/>
-              <a:t>19.03.2012</a:t>
+              <a:t>.03.2012</a:t>
             </a:r>
             <a:br>
               <a:rPr lang="bg-BG" dirty="0" smtClean="0"/>
@@ -13586,7 +13913,15 @@
             </a:pPr>
             <a:r>
               <a:rPr lang="bg-BG" dirty="0" smtClean="0"/>
-              <a:t>01.04.2012</a:t>
+              <a:t>0</a:t>
+            </a:r>
+            <a:r>
+              <a:rPr lang="en-US" dirty="0" smtClean="0"/>
+              <a:t>8</a:t>
+            </a:r>
+            <a:r>
+              <a:rPr lang="bg-BG" dirty="0" smtClean="0"/>
+              <a:t>.04.2012</a:t>
             </a:r>
           </a:p>
           <a:p>
@@ -13714,7 +14049,7 @@
         </p:nvGrpSpPr>
         <p:grpSpPr>
           <a:xfrm>
-            <a:off x="5220072" y="2780928"/>
+            <a:off x="3827747" y="2461516"/>
             <a:ext cx="2438400" cy="1905000"/>
             <a:chOff x="6084168" y="1534444"/>
             <a:chExt cx="2438400" cy="1905000"/>
@@ -13792,8 +14127,140 @@
           </p:nvSpPr>
           <p:spPr>
             <a:xfrm>
-              <a:off x="6331992" y="2926658"/>
-              <a:ext cx="2088232" cy="468052"/>
+              <a:off x="6341720" y="3164050"/>
+              <a:ext cx="2088232" cy="275394"/>
+            </a:xfrm>
+            <a:prstGeom prst="roundRect">
+              <a:avLst/>
+            </a:prstGeom>
+            <a:solidFill>
+              <a:schemeClr val="accent1">
+                <a:alpha val="5000"/>
+              </a:schemeClr>
+            </a:solidFill>
+            <a:ln>
+              <a:solidFill>
+                <a:schemeClr val="accent1">
+                  <a:shade val="50000"/>
+                  <a:alpha val="15000"/>
+                </a:schemeClr>
+              </a:solidFill>
+            </a:ln>
+          </p:spPr>
+          <p:style>
+            <a:lnRef idx="2">
+              <a:schemeClr val="accent1">
+                <a:shade val="50000"/>
+              </a:schemeClr>
+            </a:lnRef>
+            <a:fillRef idx="1">
+              <a:schemeClr val="accent1"/>
+            </a:fillRef>
+            <a:effectRef idx="0">
+              <a:schemeClr val="accent1"/>
+            </a:effectRef>
+            <a:fontRef idx="minor">
+              <a:schemeClr val="lt1"/>
+            </a:fontRef>
+          </p:style>
+          <p:txBody>
+            <a:bodyPr rtlCol="0" anchor="ctr"/>
+            <a:lstStyle/>
+            <a:p>
+              <a:pPr algn="ctr"/>
+              <a:endParaRPr lang="en-GB"/>
+            </a:p>
+          </p:txBody>
+        </p:sp>
+      </p:grpSp>
+      <p:grpSp>
+        <p:nvGrpSpPr>
+          <p:cNvPr id="9" name="Group 8"/>
+          <p:cNvGrpSpPr/>
+          <p:nvPr/>
+        </p:nvGrpSpPr>
+        <p:grpSpPr>
+          <a:xfrm>
+            <a:off x="6269712" y="2472336"/>
+            <a:ext cx="2324100" cy="2095500"/>
+            <a:chOff x="3894923" y="4088308"/>
+            <a:chExt cx="2324100" cy="2095500"/>
+          </a:xfrm>
+        </p:grpSpPr>
+        <p:pic>
+          <p:nvPicPr>
+            <p:cNvPr id="10" name="Picture 3"/>
+            <p:cNvPicPr>
+              <a:picLocks noChangeAspect="1" noChangeArrowheads="1"/>
+            </p:cNvPicPr>
+            <p:nvPr/>
+          </p:nvPicPr>
+          <p:blipFill>
+            <a:blip r:embed="rId3">
+              <a:extLst>
+                <a:ext uri="{28A0092B-C50C-407E-A947-70E740481C1C}">
+                  <a14:useLocalDpi xmlns:a14="http://schemas.microsoft.com/office/drawing/2010/main" val="0"/>
+                </a:ext>
+              </a:extLst>
+            </a:blip>
+            <a:srcRect/>
+            <a:stretch>
+              <a:fillRect/>
+            </a:stretch>
+          </p:blipFill>
+          <p:spPr bwMode="auto">
+            <a:xfrm>
+              <a:off x="3894923" y="4088308"/>
+              <a:ext cx="2324100" cy="2095500"/>
+            </a:xfrm>
+            <a:prstGeom prst="rect">
+              <a:avLst/>
+            </a:prstGeom>
+            <a:noFill/>
+            <a:ln>
+              <a:noFill/>
+            </a:ln>
+            <a:effectLst/>
+            <a:extLst>
+              <a:ext uri="{909E8E84-426E-40DD-AFC4-6F175D3DCCD1}">
+                <a14:hiddenFill xmlns:a14="http://schemas.microsoft.com/office/drawing/2010/main">
+                  <a:solidFill>
+                    <a:schemeClr val="accent1"/>
+                  </a:solidFill>
+                </a14:hiddenFill>
+              </a:ext>
+              <a:ext uri="{91240B29-F687-4F45-9708-019B960494DF}">
+                <a14:hiddenLine xmlns:a14="http://schemas.microsoft.com/office/drawing/2010/main" w="9525">
+                  <a:solidFill>
+                    <a:schemeClr val="tx1"/>
+                  </a:solidFill>
+                  <a:miter lim="800000"/>
+                  <a:headEnd/>
+                  <a:tailEnd/>
+                </a14:hiddenLine>
+              </a:ext>
+              <a:ext uri="{AF507438-7753-43E0-B8FC-AC1667EBCBE1}">
+                <a14:hiddenEffects xmlns:a14="http://schemas.microsoft.com/office/drawing/2010/main">
+                  <a:effectLst>
+                    <a:outerShdw dist="35921" dir="2700000" algn="ctr" rotWithShape="0">
+                      <a:schemeClr val="bg2"/>
+                    </a:outerShdw>
+                  </a:effectLst>
+                </a14:hiddenEffects>
+              </a:ext>
+            </a:extLst>
+          </p:spPr>
+        </p:pic>
+        <p:sp>
+          <p:nvSpPr>
+            <p:cNvPr id="13" name="Rounded Rectangle 12"/>
+            <p:cNvSpPr/>
+            <p:nvPr/>
+          </p:nvSpPr>
+          <p:spPr>
+            <a:xfrm>
+              <a:off x="4067944" y="4684932"/>
+              <a:ext cx="2088232" cy="504056"/>
             </a:xfrm>
             <a:prstGeom prst="roundRect">
               <a:avLst/>
@@ -13858,7 +14325,7 @@
 </p:sld>
 </file>
 
-<file path=ppt/slides/slide18.xml><?xml version="1.0" encoding="utf-8"?>
+<file path=ppt/slides/slide19.xml><?xml version="1.0" encoding="utf-8"?>
 <p:sld xmlns:a="http://schemas.openxmlformats.org/drawingml/2006/main" xmlns:r="http://schemas.openxmlformats.org/officeDocument/2006/relationships" xmlns:p="http://schemas.openxmlformats.org/presentationml/2006/main">
   <p:cSld>
     <p:spTree>
@@ -13945,8 +14412,28 @@
               <a:buChar char="o"/>
             </a:pPr>
             <a:r>
+              <a:rPr lang="en-US" dirty="0" smtClean="0"/>
+              <a:t>07</a:t>
+            </a:r>
+            <a:r>
               <a:rPr lang="bg-BG" dirty="0" smtClean="0"/>
-              <a:t>31.03-1.04</a:t>
+              <a:t>.0</a:t>
+            </a:r>
+            <a:r>
+              <a:rPr lang="en-US" dirty="0" smtClean="0"/>
+              <a:t>4</a:t>
+            </a:r>
+            <a:r>
+              <a:rPr lang="bg-BG" dirty="0" smtClean="0"/>
+              <a:t>-</a:t>
+            </a:r>
+            <a:r>
+              <a:rPr lang="en-US" dirty="0" smtClean="0"/>
+              <a:t>08</a:t>
+            </a:r>
+            <a:r>
+              <a:rPr lang="bg-BG" dirty="0" smtClean="0"/>
+              <a:t>.04</a:t>
             </a:r>
           </a:p>
           <a:p>
@@ -13988,7 +14475,15 @@
             </a:pPr>
             <a:r>
               <a:rPr lang="bg-BG" dirty="0" smtClean="0"/>
-              <a:t>02.04.2012</a:t>
+              <a:t>0</a:t>
+            </a:r>
+            <a:r>
+              <a:rPr lang="en-US" dirty="0" smtClean="0"/>
+              <a:t>9</a:t>
+            </a:r>
+            <a:r>
+              <a:rPr lang="bg-BG" dirty="0" smtClean="0"/>
+              <a:t>.04.2012</a:t>
             </a:r>
           </a:p>
           <a:p>
@@ -14029,8 +14524,12 @@
               <a:buChar char="o"/>
             </a:pPr>
             <a:r>
+              <a:rPr lang="en-US" dirty="0" smtClean="0"/>
+              <a:t>27</a:t>
+            </a:r>
+            <a:r>
               <a:rPr lang="bg-BG" dirty="0" smtClean="0"/>
-              <a:t>13.05.2012</a:t>
+              <a:t>.05.2012</a:t>
             </a:r>
             <a:br>
               <a:rPr lang="bg-BG" dirty="0" smtClean="0"/>
@@ -14127,9 +14626,9 @@
         <p:grpSpPr>
           <a:xfrm>
             <a:off x="3860716" y="2292858"/>
-            <a:ext cx="4657725" cy="2381913"/>
+            <a:ext cx="4657725" cy="2200275"/>
             <a:chOff x="3894923" y="4035921"/>
-            <a:chExt cx="4657725" cy="2381913"/>
+            <a:chExt cx="4657725" cy="2200275"/>
           </a:xfrm>
         </p:grpSpPr>
         <p:pic>
@@ -14268,8 +14767,8 @@
           </p:nvSpPr>
           <p:spPr>
             <a:xfrm>
-              <a:off x="6464416" y="4869766"/>
-              <a:ext cx="2088232" cy="468052"/>
+              <a:off x="6406050" y="4648551"/>
+              <a:ext cx="2088232" cy="991927"/>
             </a:xfrm>
             <a:prstGeom prst="roundRect">
               <a:avLst/>
@@ -14321,8 +14820,8 @@
           </p:nvSpPr>
           <p:spPr>
             <a:xfrm>
-              <a:off x="4067944" y="4902032"/>
-              <a:ext cx="2088232" cy="1515802"/>
+              <a:off x="4067944" y="5136059"/>
+              <a:ext cx="2088232" cy="1047750"/>
             </a:xfrm>
             <a:prstGeom prst="roundRect">
               <a:avLst/>
@@ -14387,7 +14886,236 @@
 </p:sld>
 </file>
 
-<file path=ppt/slides/slide19.xml><?xml version="1.0" encoding="utf-8"?>
+<file path=ppt/slides/slide2.xml><?xml version="1.0" encoding="utf-8"?>
+<p:sld xmlns:a="http://schemas.openxmlformats.org/drawingml/2006/main" xmlns:r="http://schemas.openxmlformats.org/officeDocument/2006/relationships" xmlns:p="http://schemas.openxmlformats.org/presentationml/2006/main">
+  <p:cSld>
+    <p:spTree>
+      <p:nvGrpSpPr>
+        <p:cNvPr id="1" name=""/>
+        <p:cNvGrpSpPr/>
+        <p:nvPr/>
+      </p:nvGrpSpPr>
+      <p:grpSpPr>
+        <a:xfrm>
+          <a:off x="0" y="0"/>
+          <a:ext cx="0" cy="0"/>
+          <a:chOff x="0" y="0"/>
+          <a:chExt cx="0" cy="0"/>
+        </a:xfrm>
+      </p:grpSpPr>
+      <p:sp>
+        <p:nvSpPr>
+          <p:cNvPr id="2" name="Title 1"/>
+          <p:cNvSpPr>
+            <a:spLocks noGrp="1"/>
+          </p:cNvSpPr>
+          <p:nvPr>
+            <p:ph type="title"/>
+          </p:nvPr>
+        </p:nvSpPr>
+        <p:spPr/>
+        <p:txBody>
+          <a:bodyPr/>
+          <a:lstStyle/>
+          <a:p>
+            <a:r>
+              <a:rPr lang="bg-BG" dirty="0" smtClean="0"/>
+              <a:t>Дневен ред</a:t>
+            </a:r>
+            <a:endParaRPr lang="en-GB" dirty="0"/>
+          </a:p>
+        </p:txBody>
+      </p:sp>
+      <p:sp>
+        <p:nvSpPr>
+          <p:cNvPr id="3" name="Content Placeholder 2"/>
+          <p:cNvSpPr>
+            <a:spLocks noGrp="1"/>
+          </p:cNvSpPr>
+          <p:nvPr>
+            <p:ph idx="1"/>
+          </p:nvPr>
+        </p:nvSpPr>
+        <p:spPr>
+          <a:xfrm>
+            <a:off x="683568" y="1600200"/>
+            <a:ext cx="8003232" cy="4525963"/>
+          </a:xfrm>
+        </p:spPr>
+        <p:txBody>
+          <a:bodyPr/>
+          <a:lstStyle/>
+          <a:p>
+            <a:pPr>
+              <a:buClr>
+                <a:schemeClr val="tx2">
+                  <a:lumMod val="75000"/>
+                </a:schemeClr>
+              </a:buClr>
+              <a:buFont typeface="Courier New" pitchFamily="49" charset="0"/>
+              <a:buChar char="o"/>
+            </a:pPr>
+            <a:r>
+              <a:rPr lang="bg-BG" dirty="0" smtClean="0"/>
+              <a:t>Състояние на работата</a:t>
+            </a:r>
+          </a:p>
+          <a:p>
+            <a:pPr>
+              <a:buClr>
+                <a:schemeClr val="tx2">
+                  <a:lumMod val="75000"/>
+                </a:schemeClr>
+              </a:buClr>
+              <a:buFont typeface="Courier New" pitchFamily="49" charset="0"/>
+              <a:buChar char="o"/>
+            </a:pPr>
+            <a:r>
+              <a:rPr lang="bg-BG" dirty="0" smtClean="0"/>
+              <a:t>Ретроспекция</a:t>
+            </a:r>
+          </a:p>
+          <a:p>
+            <a:pPr>
+              <a:buClr>
+                <a:schemeClr val="tx2">
+                  <a:lumMod val="75000"/>
+                </a:schemeClr>
+              </a:buClr>
+              <a:buFont typeface="Courier New" pitchFamily="49" charset="0"/>
+              <a:buChar char="o"/>
+            </a:pPr>
+            <a:r>
+              <a:rPr lang="bg-BG" dirty="0" smtClean="0"/>
+              <a:t>Организация на работата</a:t>
+            </a:r>
+          </a:p>
+          <a:p>
+            <a:pPr>
+              <a:buClr>
+                <a:schemeClr val="tx2">
+                  <a:lumMod val="75000"/>
+                </a:schemeClr>
+              </a:buClr>
+              <a:buFont typeface="Courier New" pitchFamily="49" charset="0"/>
+              <a:buChar char="o"/>
+            </a:pPr>
+            <a:r>
+              <a:rPr lang="bg-BG" dirty="0" smtClean="0"/>
+              <a:t>За участниците</a:t>
+            </a:r>
+          </a:p>
+          <a:p>
+            <a:pPr>
+              <a:buClr>
+                <a:schemeClr val="tx2">
+                  <a:lumMod val="75000"/>
+                </a:schemeClr>
+              </a:buClr>
+              <a:buFont typeface="Courier New" pitchFamily="49" charset="0"/>
+              <a:buChar char="o"/>
+            </a:pPr>
+            <a:r>
+              <a:rPr lang="bg-BG" dirty="0" smtClean="0"/>
+              <a:t>Планиране на следващите итерации</a:t>
+            </a:r>
+          </a:p>
+          <a:p>
+            <a:pPr>
+              <a:buClr>
+                <a:schemeClr val="tx2">
+                  <a:lumMod val="75000"/>
+                </a:schemeClr>
+              </a:buClr>
+              <a:buFont typeface="Courier New" pitchFamily="49" charset="0"/>
+              <a:buChar char="o"/>
+            </a:pPr>
+            <a:r>
+              <a:rPr lang="bg-BG" dirty="0" smtClean="0"/>
+              <a:t>Дискусия</a:t>
+            </a:r>
+          </a:p>
+          <a:p>
+            <a:endParaRPr lang="en-GB" dirty="0"/>
+          </a:p>
+        </p:txBody>
+      </p:sp>
+      <p:sp>
+        <p:nvSpPr>
+          <p:cNvPr id="8" name="Round Diagonal Corner Rectangle 7"/>
+          <p:cNvSpPr/>
+          <p:nvPr/>
+        </p:nvSpPr>
+        <p:spPr>
+          <a:xfrm rot="10800000">
+            <a:off x="467544" y="260648"/>
+            <a:ext cx="8208912" cy="6264696"/>
+          </a:xfrm>
+          <a:prstGeom prst="round2DiagRect">
+            <a:avLst/>
+          </a:prstGeom>
+          <a:noFill/>
+          <a:ln>
+            <a:solidFill>
+              <a:schemeClr val="accent1">
+                <a:shade val="50000"/>
+              </a:schemeClr>
+            </a:solidFill>
+          </a:ln>
+          <a:effectLst>
+            <a:outerShdw blurRad="50800" dist="38100" dir="2700000" algn="tl" rotWithShape="0">
+              <a:prstClr val="black">
+                <a:alpha val="40000"/>
+              </a:prstClr>
+            </a:outerShdw>
+          </a:effectLst>
+        </p:spPr>
+        <p:style>
+          <a:lnRef idx="2">
+            <a:schemeClr val="accent1">
+              <a:shade val="50000"/>
+            </a:schemeClr>
+          </a:lnRef>
+          <a:fillRef idx="1">
+            <a:schemeClr val="accent1"/>
+          </a:fillRef>
+          <a:effectRef idx="0">
+            <a:schemeClr val="accent1"/>
+          </a:effectRef>
+          <a:fontRef idx="minor">
+            <a:schemeClr val="lt1"/>
+          </a:fontRef>
+        </p:style>
+        <p:txBody>
+          <a:bodyPr rtlCol="0" anchor="ctr"/>
+          <a:lstStyle/>
+          <a:p>
+            <a:pPr algn="ctr"/>
+            <a:endParaRPr lang="en-GB"/>
+          </a:p>
+        </p:txBody>
+      </p:sp>
+    </p:spTree>
+    <p:extLst>
+      <p:ext uri="{BB962C8B-B14F-4D97-AF65-F5344CB8AC3E}">
+        <p14:creationId xmlns:p14="http://schemas.microsoft.com/office/powerpoint/2010/main" val="2513954848"/>
+      </p:ext>
+    </p:extLst>
+  </p:cSld>
+  <p:clrMapOvr>
+    <a:masterClrMapping/>
+  </p:clrMapOvr>
+  <p:timing>
+    <p:tnLst>
+      <p:par>
+        <p:cTn id="1" dur="indefinite" restart="never" nodeType="tmRoot"/>
+      </p:par>
+    </p:tnLst>
+  </p:timing>
+</p:sld>
+</file>
+
+<file path=ppt/slides/slide20.xml><?xml version="1.0" encoding="utf-8"?>
 <p:sld xmlns:a="http://schemas.openxmlformats.org/drawingml/2006/main" xmlns:r="http://schemas.openxmlformats.org/officeDocument/2006/relationships" xmlns:p="http://schemas.openxmlformats.org/presentationml/2006/main">
   <p:cSld>
     <p:spTree>
@@ -14777,236 +15505,7 @@
 </p:sld>
 </file>
 
-<file path=ppt/slides/slide2.xml><?xml version="1.0" encoding="utf-8"?>
-<p:sld xmlns:a="http://schemas.openxmlformats.org/drawingml/2006/main" xmlns:r="http://schemas.openxmlformats.org/officeDocument/2006/relationships" xmlns:p="http://schemas.openxmlformats.org/presentationml/2006/main">
-  <p:cSld>
-    <p:spTree>
-      <p:nvGrpSpPr>
-        <p:cNvPr id="1" name=""/>
-        <p:cNvGrpSpPr/>
-        <p:nvPr/>
-      </p:nvGrpSpPr>
-      <p:grpSpPr>
-        <a:xfrm>
-          <a:off x="0" y="0"/>
-          <a:ext cx="0" cy="0"/>
-          <a:chOff x="0" y="0"/>
-          <a:chExt cx="0" cy="0"/>
-        </a:xfrm>
-      </p:grpSpPr>
-      <p:sp>
-        <p:nvSpPr>
-          <p:cNvPr id="2" name="Title 1"/>
-          <p:cNvSpPr>
-            <a:spLocks noGrp="1"/>
-          </p:cNvSpPr>
-          <p:nvPr>
-            <p:ph type="title"/>
-          </p:nvPr>
-        </p:nvSpPr>
-        <p:spPr/>
-        <p:txBody>
-          <a:bodyPr/>
-          <a:lstStyle/>
-          <a:p>
-            <a:r>
-              <a:rPr lang="bg-BG" dirty="0" smtClean="0"/>
-              <a:t>Дневен ред</a:t>
-            </a:r>
-            <a:endParaRPr lang="en-GB" dirty="0"/>
-          </a:p>
-        </p:txBody>
-      </p:sp>
-      <p:sp>
-        <p:nvSpPr>
-          <p:cNvPr id="3" name="Content Placeholder 2"/>
-          <p:cNvSpPr>
-            <a:spLocks noGrp="1"/>
-          </p:cNvSpPr>
-          <p:nvPr>
-            <p:ph idx="1"/>
-          </p:nvPr>
-        </p:nvSpPr>
-        <p:spPr>
-          <a:xfrm>
-            <a:off x="683568" y="1600200"/>
-            <a:ext cx="8003232" cy="4525963"/>
-          </a:xfrm>
-        </p:spPr>
-        <p:txBody>
-          <a:bodyPr/>
-          <a:lstStyle/>
-          <a:p>
-            <a:pPr>
-              <a:buClr>
-                <a:schemeClr val="tx2">
-                  <a:lumMod val="75000"/>
-                </a:schemeClr>
-              </a:buClr>
-              <a:buFont typeface="Courier New" pitchFamily="49" charset="0"/>
-              <a:buChar char="o"/>
-            </a:pPr>
-            <a:r>
-              <a:rPr lang="bg-BG" dirty="0" smtClean="0"/>
-              <a:t>Състояние на работата</a:t>
-            </a:r>
-          </a:p>
-          <a:p>
-            <a:pPr>
-              <a:buClr>
-                <a:schemeClr val="tx2">
-                  <a:lumMod val="75000"/>
-                </a:schemeClr>
-              </a:buClr>
-              <a:buFont typeface="Courier New" pitchFamily="49" charset="0"/>
-              <a:buChar char="o"/>
-            </a:pPr>
-            <a:r>
-              <a:rPr lang="bg-BG" dirty="0" smtClean="0"/>
-              <a:t>Ретроспекция</a:t>
-            </a:r>
-          </a:p>
-          <a:p>
-            <a:pPr>
-              <a:buClr>
-                <a:schemeClr val="tx2">
-                  <a:lumMod val="75000"/>
-                </a:schemeClr>
-              </a:buClr>
-              <a:buFont typeface="Courier New" pitchFamily="49" charset="0"/>
-              <a:buChar char="o"/>
-            </a:pPr>
-            <a:r>
-              <a:rPr lang="bg-BG" dirty="0" smtClean="0"/>
-              <a:t>Организация на работата</a:t>
-            </a:r>
-          </a:p>
-          <a:p>
-            <a:pPr>
-              <a:buClr>
-                <a:schemeClr val="tx2">
-                  <a:lumMod val="75000"/>
-                </a:schemeClr>
-              </a:buClr>
-              <a:buFont typeface="Courier New" pitchFamily="49" charset="0"/>
-              <a:buChar char="o"/>
-            </a:pPr>
-            <a:r>
-              <a:rPr lang="bg-BG" dirty="0" smtClean="0"/>
-              <a:t>За участниците</a:t>
-            </a:r>
-          </a:p>
-          <a:p>
-            <a:pPr>
-              <a:buClr>
-                <a:schemeClr val="tx2">
-                  <a:lumMod val="75000"/>
-                </a:schemeClr>
-              </a:buClr>
-              <a:buFont typeface="Courier New" pitchFamily="49" charset="0"/>
-              <a:buChar char="o"/>
-            </a:pPr>
-            <a:r>
-              <a:rPr lang="bg-BG" dirty="0" smtClean="0"/>
-              <a:t>Планиране на следващите итерации</a:t>
-            </a:r>
-          </a:p>
-          <a:p>
-            <a:pPr>
-              <a:buClr>
-                <a:schemeClr val="tx2">
-                  <a:lumMod val="75000"/>
-                </a:schemeClr>
-              </a:buClr>
-              <a:buFont typeface="Courier New" pitchFamily="49" charset="0"/>
-              <a:buChar char="o"/>
-            </a:pPr>
-            <a:r>
-              <a:rPr lang="bg-BG" dirty="0" smtClean="0"/>
-              <a:t>Дискусия</a:t>
-            </a:r>
-          </a:p>
-          <a:p>
-            <a:endParaRPr lang="en-GB" dirty="0"/>
-          </a:p>
-        </p:txBody>
-      </p:sp>
-      <p:sp>
-        <p:nvSpPr>
-          <p:cNvPr id="8" name="Round Diagonal Corner Rectangle 7"/>
-          <p:cNvSpPr/>
-          <p:nvPr/>
-        </p:nvSpPr>
-        <p:spPr>
-          <a:xfrm rot="10800000">
-            <a:off x="467544" y="260648"/>
-            <a:ext cx="8208912" cy="6264696"/>
-          </a:xfrm>
-          <a:prstGeom prst="round2DiagRect">
-            <a:avLst/>
-          </a:prstGeom>
-          <a:noFill/>
-          <a:ln>
-            <a:solidFill>
-              <a:schemeClr val="accent1">
-                <a:shade val="50000"/>
-              </a:schemeClr>
-            </a:solidFill>
-          </a:ln>
-          <a:effectLst>
-            <a:outerShdw blurRad="50800" dist="38100" dir="2700000" algn="tl" rotWithShape="0">
-              <a:prstClr val="black">
-                <a:alpha val="40000"/>
-              </a:prstClr>
-            </a:outerShdw>
-          </a:effectLst>
-        </p:spPr>
-        <p:style>
-          <a:lnRef idx="2">
-            <a:schemeClr val="accent1">
-              <a:shade val="50000"/>
-            </a:schemeClr>
-          </a:lnRef>
-          <a:fillRef idx="1">
-            <a:schemeClr val="accent1"/>
-          </a:fillRef>
-          <a:effectRef idx="0">
-            <a:schemeClr val="accent1"/>
-          </a:effectRef>
-          <a:fontRef idx="minor">
-            <a:schemeClr val="lt1"/>
-          </a:fontRef>
-        </p:style>
-        <p:txBody>
-          <a:bodyPr rtlCol="0" anchor="ctr"/>
-          <a:lstStyle/>
-          <a:p>
-            <a:pPr algn="ctr"/>
-            <a:endParaRPr lang="en-GB"/>
-          </a:p>
-        </p:txBody>
-      </p:sp>
-    </p:spTree>
-    <p:extLst>
-      <p:ext uri="{BB962C8B-B14F-4D97-AF65-F5344CB8AC3E}">
-        <p14:creationId xmlns:p14="http://schemas.microsoft.com/office/powerpoint/2010/main" val="2513954848"/>
-      </p:ext>
-    </p:extLst>
-  </p:cSld>
-  <p:clrMapOvr>
-    <a:masterClrMapping/>
-  </p:clrMapOvr>
-  <p:timing>
-    <p:tnLst>
-      <p:par>
-        <p:cTn id="1" dur="indefinite" restart="never" nodeType="tmRoot"/>
-      </p:par>
-    </p:tnLst>
-  </p:timing>
-</p:sld>
-</file>
-
-<file path=ppt/slides/slide20.xml><?xml version="1.0" encoding="utf-8"?>
+<file path=ppt/slides/slide21.xml><?xml version="1.0" encoding="utf-8"?>
 <p:sld xmlns:a="http://schemas.openxmlformats.org/drawingml/2006/main" xmlns:r="http://schemas.openxmlformats.org/officeDocument/2006/relationships" xmlns:p="http://schemas.openxmlformats.org/presentationml/2006/main">
   <p:cSld>
     <p:spTree>
@@ -15386,7 +15885,7 @@
 </p:sld>
 </file>
 
-<file path=ppt/slides/slide21.xml><?xml version="1.0" encoding="utf-8"?>
+<file path=ppt/slides/slide22.xml><?xml version="1.0" encoding="utf-8"?>
 <p:sld xmlns:a="http://schemas.openxmlformats.org/drawingml/2006/main" xmlns:r="http://schemas.openxmlformats.org/officeDocument/2006/relationships" xmlns:p="http://schemas.openxmlformats.org/presentationml/2006/main">
   <p:cSld>
     <p:spTree>
@@ -15679,7 +16178,7 @@
 </p:sld>
 </file>
 
-<file path=ppt/slides/slide22.xml><?xml version="1.0" encoding="utf-8"?>
+<file path=ppt/slides/slide23.xml><?xml version="1.0" encoding="utf-8"?>
 <p:sld xmlns:a="http://schemas.openxmlformats.org/drawingml/2006/main" xmlns:r="http://schemas.openxmlformats.org/officeDocument/2006/relationships" xmlns:p="http://schemas.openxmlformats.org/presentationml/2006/main">
   <p:cSld>
     <p:spTree>
@@ -15737,7 +16236,7 @@
         </p:spPr>
         <p:txBody>
           <a:bodyPr>
-            <a:normAutofit/>
+            <a:normAutofit fontScale="85000" lnSpcReduction="20000"/>
           </a:bodyPr>
           <a:lstStyle/>
           <a:p>
@@ -15817,7 +16316,142 @@
             </a:pPr>
             <a:r>
               <a:rPr lang="bg-BG" dirty="0" smtClean="0"/>
-              <a:t>...</a:t>
+              <a:t>Изложението трябва да е в </a:t>
+            </a:r>
+            <a:r>
+              <a:rPr lang="bg-BG" b="1" dirty="0" smtClean="0"/>
+              <a:t>1 л. мн. </a:t>
+            </a:r>
+            <a:r>
+              <a:rPr lang="bg-BG" b="1" dirty="0"/>
+              <a:t>ч</a:t>
+            </a:r>
+            <a:r>
+              <a:rPr lang="bg-BG" b="1" dirty="0" smtClean="0"/>
+              <a:t>.</a:t>
+            </a:r>
+          </a:p>
+          <a:p>
+            <a:pPr lvl="1">
+              <a:buClr>
+                <a:schemeClr val="tx2">
+                  <a:lumMod val="75000"/>
+                </a:schemeClr>
+              </a:buClr>
+              <a:buFont typeface="Courier New" pitchFamily="49" charset="0"/>
+              <a:buChar char="o"/>
+            </a:pPr>
+            <a:r>
+              <a:rPr lang="bg-BG" dirty="0" smtClean="0"/>
+              <a:t>например: „Нека разгледа</a:t>
+            </a:r>
+            <a:r>
+              <a:rPr lang="bg-BG" b="1" dirty="0" smtClean="0"/>
+              <a:t>ме</a:t>
+            </a:r>
+            <a:r>
+              <a:rPr lang="bg-BG" dirty="0" smtClean="0"/>
+              <a:t> този случай...“</a:t>
+            </a:r>
+          </a:p>
+          <a:p>
+            <a:pPr lvl="1">
+              <a:buClr>
+                <a:schemeClr val="tx2">
+                  <a:lumMod val="75000"/>
+                </a:schemeClr>
+              </a:buClr>
+              <a:buFont typeface="Courier New" pitchFamily="49" charset="0"/>
+              <a:buChar char="o"/>
+            </a:pPr>
+            <a:r>
+              <a:rPr lang="bg-BG" dirty="0" smtClean="0"/>
+              <a:t>водим читателя „за ръка“ докато обясняваме</a:t>
+            </a:r>
+          </a:p>
+          <a:p>
+            <a:pPr lvl="1">
+              <a:buClr>
+                <a:schemeClr val="tx2">
+                  <a:lumMod val="75000"/>
+                </a:schemeClr>
+              </a:buClr>
+              <a:buFont typeface="Courier New" pitchFamily="49" charset="0"/>
+              <a:buChar char="o"/>
+            </a:pPr>
+            <a:r>
+              <a:rPr lang="bg-BG" dirty="0" smtClean="0"/>
+              <a:t>вж. </a:t>
+            </a:r>
+            <a:r>
+              <a:rPr lang="bg-BG" b="1" dirty="0" smtClean="0"/>
+              <a:t>ръководството на автора</a:t>
+            </a:r>
+          </a:p>
+          <a:p>
+            <a:pPr>
+              <a:buClr>
+                <a:schemeClr val="tx2">
+                  <a:lumMod val="75000"/>
+                </a:schemeClr>
+              </a:buClr>
+              <a:buFont typeface="Courier New" pitchFamily="49" charset="0"/>
+              <a:buChar char="o"/>
+            </a:pPr>
+            <a:r>
+              <a:rPr lang="bg-BG" dirty="0" smtClean="0"/>
+              <a:t>Стилът</a:t>
+            </a:r>
+            <a:r>
+              <a:rPr lang="es-ES" dirty="0" smtClean="0"/>
+              <a:t> </a:t>
+            </a:r>
+            <a:r>
+              <a:rPr lang="en-US" dirty="0" smtClean="0"/>
+              <a:t>DBP-Code ≠</a:t>
+            </a:r>
+            <a:r>
+              <a:rPr lang="bg-BG" dirty="0"/>
+              <a:t> к</a:t>
+            </a:r>
+            <a:r>
+              <a:rPr lang="bg-BG" dirty="0" smtClean="0"/>
+              <a:t>одът, който се вмъква от </a:t>
+            </a:r>
+            <a:r>
+              <a:rPr lang="es-ES" dirty="0" smtClean="0"/>
+              <a:t>Eclipse</a:t>
+            </a:r>
+          </a:p>
+          <a:p>
+            <a:pPr lvl="1">
+              <a:buClr>
+                <a:schemeClr val="tx2">
+                  <a:lumMod val="75000"/>
+                </a:schemeClr>
+              </a:buClr>
+              <a:buFont typeface="Courier New" pitchFamily="49" charset="0"/>
+              <a:buChar char="o"/>
+            </a:pPr>
+            <a:r>
+              <a:rPr lang="en-US" b="1" dirty="0" smtClean="0"/>
+              <a:t>DBP-Code </a:t>
+            </a:r>
+            <a:r>
+              <a:rPr lang="bg-BG" b="1" dirty="0" smtClean="0"/>
+              <a:t>се използва в текста</a:t>
+            </a:r>
+            <a:r>
+              <a:rPr lang="bg-BG" dirty="0" smtClean="0"/>
+              <a:t> (вж. </a:t>
+            </a:r>
+            <a:r>
+              <a:rPr lang="bg-BG" b="1" dirty="0" smtClean="0"/>
+              <a:t>ръководство на автора</a:t>
+            </a:r>
+            <a:r>
+              <a:rPr lang="bg-BG" dirty="0" smtClean="0"/>
+              <a:t>)</a:t>
             </a:r>
             <a:endParaRPr lang="en-GB" dirty="0"/>
           </a:p>
@@ -15898,7 +16532,1009 @@
 </p:sld>
 </file>
 
-<file path=ppt/slides/slide23.xml><?xml version="1.0" encoding="utf-8"?>
+<file path=ppt/slides/slide24.xml><?xml version="1.0" encoding="utf-8"?>
+<p:sld xmlns:a="http://schemas.openxmlformats.org/drawingml/2006/main" xmlns:r="http://schemas.openxmlformats.org/officeDocument/2006/relationships" xmlns:p="http://schemas.openxmlformats.org/presentationml/2006/main">
+  <p:cSld>
+    <p:spTree>
+      <p:nvGrpSpPr>
+        <p:cNvPr id="1" name=""/>
+        <p:cNvGrpSpPr/>
+        <p:nvPr/>
+      </p:nvGrpSpPr>
+      <p:grpSpPr>
+        <a:xfrm>
+          <a:off x="0" y="0"/>
+          <a:ext cx="0" cy="0"/>
+          <a:chOff x="0" y="0"/>
+          <a:chExt cx="0" cy="0"/>
+        </a:xfrm>
+      </p:grpSpPr>
+      <p:sp>
+        <p:nvSpPr>
+          <p:cNvPr id="2" name="Title 1"/>
+          <p:cNvSpPr>
+            <a:spLocks noGrp="1"/>
+          </p:cNvSpPr>
+          <p:nvPr>
+            <p:ph type="title"/>
+          </p:nvPr>
+        </p:nvSpPr>
+        <p:spPr/>
+        <p:txBody>
+          <a:bodyPr/>
+          <a:lstStyle/>
+          <a:p>
+            <a:r>
+              <a:rPr lang="bg-BG" dirty="0" smtClean="0"/>
+              <a:t>Дискусия (</a:t>
+            </a:r>
+            <a:r>
+              <a:rPr lang="en-US" dirty="0" smtClean="0"/>
+              <a:t>3</a:t>
+            </a:r>
+            <a:r>
+              <a:rPr lang="bg-BG" dirty="0" smtClean="0"/>
+              <a:t>)</a:t>
+            </a:r>
+            <a:endParaRPr lang="en-GB" dirty="0"/>
+          </a:p>
+        </p:txBody>
+      </p:sp>
+      <p:sp>
+        <p:nvSpPr>
+          <p:cNvPr id="3" name="Content Placeholder 2"/>
+          <p:cNvSpPr>
+            <a:spLocks noGrp="1"/>
+          </p:cNvSpPr>
+          <p:nvPr>
+            <p:ph idx="1"/>
+          </p:nvPr>
+        </p:nvSpPr>
+        <p:spPr>
+          <a:xfrm>
+            <a:off x="683568" y="1600200"/>
+            <a:ext cx="8003232" cy="4853136"/>
+          </a:xfrm>
+        </p:spPr>
+        <p:txBody>
+          <a:bodyPr>
+            <a:normAutofit/>
+          </a:bodyPr>
+          <a:lstStyle/>
+          <a:p>
+            <a:pPr>
+              <a:buClr>
+                <a:schemeClr val="tx2">
+                  <a:lumMod val="75000"/>
+                </a:schemeClr>
+              </a:buClr>
+              <a:buFont typeface="Courier New" pitchFamily="49" charset="0"/>
+              <a:buChar char="o"/>
+            </a:pPr>
+            <a:r>
+              <a:rPr lang="bg-BG" dirty="0" smtClean="0"/>
+              <a:t>Вмъкнатият код от </a:t>
+            </a:r>
+            <a:r>
+              <a:rPr lang="es-ES" dirty="0" smtClean="0"/>
+              <a:t>Eclipse </a:t>
+            </a:r>
+            <a:endParaRPr lang="en-US" dirty="0" smtClean="0"/>
+          </a:p>
+          <a:p>
+            <a:pPr lvl="1">
+              <a:buClr>
+                <a:schemeClr val="tx2">
+                  <a:lumMod val="75000"/>
+                </a:schemeClr>
+              </a:buClr>
+              <a:buFont typeface="Courier New" pitchFamily="49" charset="0"/>
+              <a:buChar char="o"/>
+            </a:pPr>
+            <a:r>
+              <a:rPr lang="bg-BG" dirty="0"/>
+              <a:t>кодът трябва да е в </a:t>
+            </a:r>
+            <a:r>
+              <a:rPr lang="bg-BG" b="1" dirty="0"/>
+              <a:t>таблица</a:t>
+            </a:r>
+          </a:p>
+          <a:p>
+            <a:pPr lvl="2">
+              <a:buClr>
+                <a:schemeClr val="tx2">
+                  <a:lumMod val="75000"/>
+                </a:schemeClr>
+              </a:buClr>
+              <a:buFont typeface="Courier New" pitchFamily="49" charset="0"/>
+              <a:buChar char="o"/>
+            </a:pPr>
+            <a:r>
+              <a:rPr lang="bg-BG" dirty="0"/>
+              <a:t>вж. </a:t>
+            </a:r>
+            <a:r>
+              <a:rPr lang="bg-BG" b="1" dirty="0"/>
+              <a:t>ръководството на автора</a:t>
+            </a:r>
+          </a:p>
+          <a:p>
+            <a:pPr lvl="1">
+              <a:buClr>
+                <a:schemeClr val="tx2">
+                  <a:lumMod val="75000"/>
+                </a:schemeClr>
+              </a:buClr>
+              <a:buFont typeface="Courier New" pitchFamily="49" charset="0"/>
+              <a:buChar char="o"/>
+            </a:pPr>
+            <a:r>
+              <a:rPr lang="bg-BG" b="1" dirty="0" smtClean="0"/>
+              <a:t>запазваме стилът </a:t>
+            </a:r>
+            <a:r>
+              <a:rPr lang="bg-BG" dirty="0" smtClean="0"/>
+              <a:t>му (оцветяване и т.н.)</a:t>
+            </a:r>
+          </a:p>
+          <a:p>
+            <a:pPr lvl="2">
+              <a:buClr>
+                <a:schemeClr val="tx2">
+                  <a:lumMod val="75000"/>
+                </a:schemeClr>
+              </a:buClr>
+              <a:buFont typeface="Courier New" pitchFamily="49" charset="0"/>
+              <a:buChar char="o"/>
+            </a:pPr>
+            <a:r>
+              <a:rPr lang="bg-BG" dirty="0" smtClean="0"/>
+              <a:t>въпреки различните вмъкнати стилове</a:t>
+            </a:r>
+          </a:p>
+          <a:p>
+            <a:pPr lvl="1">
+              <a:buClr>
+                <a:schemeClr val="tx2">
+                  <a:lumMod val="75000"/>
+                </a:schemeClr>
+              </a:buClr>
+              <a:buFont typeface="Courier New" pitchFamily="49" charset="0"/>
+              <a:buChar char="o"/>
+            </a:pPr>
+            <a:endParaRPr lang="bg-BG" dirty="0"/>
+          </a:p>
+          <a:p>
+            <a:pPr lvl="1">
+              <a:buClr>
+                <a:schemeClr val="tx2">
+                  <a:lumMod val="75000"/>
+                </a:schemeClr>
+              </a:buClr>
+              <a:buFont typeface="Courier New" pitchFamily="49" charset="0"/>
+              <a:buChar char="o"/>
+            </a:pPr>
+            <a:endParaRPr lang="bg-BG" dirty="0" smtClean="0"/>
+          </a:p>
+          <a:p>
+            <a:pPr lvl="1">
+              <a:buClr>
+                <a:schemeClr val="tx2">
+                  <a:lumMod val="75000"/>
+                </a:schemeClr>
+              </a:buClr>
+              <a:buFont typeface="Courier New" pitchFamily="49" charset="0"/>
+              <a:buChar char="o"/>
+            </a:pPr>
+            <a:endParaRPr lang="bg-BG" dirty="0"/>
+          </a:p>
+          <a:p>
+            <a:pPr lvl="1">
+              <a:buClr>
+                <a:schemeClr val="tx2">
+                  <a:lumMod val="75000"/>
+                </a:schemeClr>
+              </a:buClr>
+              <a:buFont typeface="Courier New" pitchFamily="49" charset="0"/>
+              <a:buChar char="o"/>
+            </a:pPr>
+            <a:endParaRPr lang="bg-BG" dirty="0" smtClean="0"/>
+          </a:p>
+          <a:p>
+            <a:pPr lvl="1">
+              <a:buClr>
+                <a:schemeClr val="tx2">
+                  <a:lumMod val="75000"/>
+                </a:schemeClr>
+              </a:buClr>
+              <a:buFont typeface="Courier New" pitchFamily="49" charset="0"/>
+              <a:buChar char="o"/>
+            </a:pPr>
+            <a:endParaRPr lang="bg-BG" dirty="0"/>
+          </a:p>
+          <a:p>
+            <a:pPr lvl="1">
+              <a:buClr>
+                <a:schemeClr val="tx2">
+                  <a:lumMod val="75000"/>
+                </a:schemeClr>
+              </a:buClr>
+              <a:buFont typeface="Courier New" pitchFamily="49" charset="0"/>
+              <a:buChar char="o"/>
+            </a:pPr>
+            <a:endParaRPr lang="bg-BG" dirty="0" smtClean="0"/>
+          </a:p>
+        </p:txBody>
+      </p:sp>
+      <p:sp>
+        <p:nvSpPr>
+          <p:cNvPr id="8" name="Round Diagonal Corner Rectangle 7"/>
+          <p:cNvSpPr/>
+          <p:nvPr/>
+        </p:nvSpPr>
+        <p:spPr>
+          <a:xfrm rot="10800000">
+            <a:off x="467544" y="260648"/>
+            <a:ext cx="8208912" cy="6264696"/>
+          </a:xfrm>
+          <a:prstGeom prst="round2DiagRect">
+            <a:avLst/>
+          </a:prstGeom>
+          <a:noFill/>
+          <a:ln>
+            <a:solidFill>
+              <a:schemeClr val="accent1">
+                <a:shade val="50000"/>
+              </a:schemeClr>
+            </a:solidFill>
+          </a:ln>
+          <a:effectLst>
+            <a:outerShdw blurRad="50800" dist="38100" dir="2700000" algn="tl" rotWithShape="0">
+              <a:prstClr val="black">
+                <a:alpha val="40000"/>
+              </a:prstClr>
+            </a:outerShdw>
+          </a:effectLst>
+        </p:spPr>
+        <p:style>
+          <a:lnRef idx="2">
+            <a:schemeClr val="accent1">
+              <a:shade val="50000"/>
+            </a:schemeClr>
+          </a:lnRef>
+          <a:fillRef idx="1">
+            <a:schemeClr val="accent1"/>
+          </a:fillRef>
+          <a:effectRef idx="0">
+            <a:schemeClr val="accent1"/>
+          </a:effectRef>
+          <a:fontRef idx="minor">
+            <a:schemeClr val="lt1"/>
+          </a:fontRef>
+        </p:style>
+        <p:txBody>
+          <a:bodyPr rtlCol="0" anchor="ctr"/>
+          <a:lstStyle/>
+          <a:p>
+            <a:pPr algn="ctr"/>
+            <a:endParaRPr lang="en-GB"/>
+          </a:p>
+        </p:txBody>
+      </p:sp>
+      <p:pic>
+        <p:nvPicPr>
+          <p:cNvPr id="6" name="Picture 5"/>
+          <p:cNvPicPr>
+            <a:picLocks noChangeAspect="1"/>
+          </p:cNvPicPr>
+          <p:nvPr/>
+        </p:nvPicPr>
+        <p:blipFill>
+          <a:blip r:embed="rId2">
+            <a:extLst>
+              <a:ext uri="{28A0092B-C50C-407E-A947-70E740481C1C}">
+                <a14:useLocalDpi xmlns:a14="http://schemas.microsoft.com/office/drawing/2010/main" val="0"/>
+              </a:ext>
+            </a:extLst>
+          </a:blip>
+          <a:stretch>
+            <a:fillRect/>
+          </a:stretch>
+        </p:blipFill>
+        <p:spPr>
+          <a:xfrm>
+            <a:off x="652386" y="4077072"/>
+            <a:ext cx="7851785" cy="2304256"/>
+          </a:xfrm>
+          <a:prstGeom prst="rect">
+            <a:avLst/>
+          </a:prstGeom>
+          <a:ln w="12700">
+            <a:solidFill>
+              <a:schemeClr val="accent1">
+                <a:lumMod val="75000"/>
+              </a:schemeClr>
+            </a:solidFill>
+          </a:ln>
+        </p:spPr>
+      </p:pic>
+      <p:sp>
+        <p:nvSpPr>
+          <p:cNvPr id="7" name="Up-Down Arrow 6"/>
+          <p:cNvSpPr/>
+          <p:nvPr/>
+        </p:nvSpPr>
+        <p:spPr>
+          <a:xfrm rot="3815355">
+            <a:off x="5981399" y="4205338"/>
+            <a:ext cx="484632" cy="1357324"/>
+          </a:xfrm>
+          <a:prstGeom prst="upDownArrow">
+            <a:avLst/>
+          </a:prstGeom>
+          <a:solidFill>
+            <a:schemeClr val="accent1">
+              <a:lumMod val="60000"/>
+              <a:lumOff val="40000"/>
+            </a:schemeClr>
+          </a:solidFill>
+          <a:ln>
+            <a:solidFill>
+              <a:schemeClr val="accent1">
+                <a:lumMod val="75000"/>
+              </a:schemeClr>
+            </a:solidFill>
+          </a:ln>
+        </p:spPr>
+        <p:style>
+          <a:lnRef idx="2">
+            <a:schemeClr val="accent1">
+              <a:shade val="50000"/>
+            </a:schemeClr>
+          </a:lnRef>
+          <a:fillRef idx="1">
+            <a:schemeClr val="accent1"/>
+          </a:fillRef>
+          <a:effectRef idx="0">
+            <a:schemeClr val="accent1"/>
+          </a:effectRef>
+          <a:fontRef idx="minor">
+            <a:schemeClr val="lt1"/>
+          </a:fontRef>
+        </p:style>
+        <p:txBody>
+          <a:bodyPr rtlCol="0" anchor="ctr"/>
+          <a:lstStyle/>
+          <a:p>
+            <a:pPr algn="ctr"/>
+            <a:endParaRPr lang="en-GB"/>
+          </a:p>
+        </p:txBody>
+      </p:sp>
+    </p:spTree>
+    <p:extLst>
+      <p:ext uri="{BB962C8B-B14F-4D97-AF65-F5344CB8AC3E}">
+        <p14:creationId xmlns:p14="http://schemas.microsoft.com/office/powerpoint/2010/main" val="1354942473"/>
+      </p:ext>
+    </p:extLst>
+  </p:cSld>
+  <p:clrMapOvr>
+    <a:masterClrMapping/>
+  </p:clrMapOvr>
+  <p:timing>
+    <p:tnLst>
+      <p:par>
+        <p:cTn id="1" dur="indefinite" restart="never" nodeType="tmRoot"/>
+      </p:par>
+    </p:tnLst>
+  </p:timing>
+</p:sld>
+</file>
+
+<file path=ppt/slides/slide25.xml><?xml version="1.0" encoding="utf-8"?>
+<p:sld xmlns:a="http://schemas.openxmlformats.org/drawingml/2006/main" xmlns:r="http://schemas.openxmlformats.org/officeDocument/2006/relationships" xmlns:p="http://schemas.openxmlformats.org/presentationml/2006/main">
+  <p:cSld>
+    <p:spTree>
+      <p:nvGrpSpPr>
+        <p:cNvPr id="1" name=""/>
+        <p:cNvGrpSpPr/>
+        <p:nvPr/>
+      </p:nvGrpSpPr>
+      <p:grpSpPr>
+        <a:xfrm>
+          <a:off x="0" y="0"/>
+          <a:ext cx="0" cy="0"/>
+          <a:chOff x="0" y="0"/>
+          <a:chExt cx="0" cy="0"/>
+        </a:xfrm>
+      </p:grpSpPr>
+      <p:sp>
+        <p:nvSpPr>
+          <p:cNvPr id="2" name="Title 1"/>
+          <p:cNvSpPr>
+            <a:spLocks noGrp="1"/>
+          </p:cNvSpPr>
+          <p:nvPr>
+            <p:ph type="title"/>
+          </p:nvPr>
+        </p:nvSpPr>
+        <p:spPr/>
+        <p:txBody>
+          <a:bodyPr/>
+          <a:lstStyle/>
+          <a:p>
+            <a:r>
+              <a:rPr lang="bg-BG" dirty="0" smtClean="0"/>
+              <a:t>Дискусия (</a:t>
+            </a:r>
+            <a:r>
+              <a:rPr lang="en-US" dirty="0" smtClean="0"/>
+              <a:t>4</a:t>
+            </a:r>
+            <a:r>
+              <a:rPr lang="bg-BG" dirty="0" smtClean="0"/>
+              <a:t>)</a:t>
+            </a:r>
+            <a:endParaRPr lang="en-GB" dirty="0"/>
+          </a:p>
+        </p:txBody>
+      </p:sp>
+      <p:sp>
+        <p:nvSpPr>
+          <p:cNvPr id="3" name="Content Placeholder 2"/>
+          <p:cNvSpPr>
+            <a:spLocks noGrp="1"/>
+          </p:cNvSpPr>
+          <p:nvPr>
+            <p:ph idx="1"/>
+          </p:nvPr>
+        </p:nvSpPr>
+        <p:spPr>
+          <a:xfrm>
+            <a:off x="683568" y="1600200"/>
+            <a:ext cx="8003232" cy="4525963"/>
+          </a:xfrm>
+        </p:spPr>
+        <p:txBody>
+          <a:bodyPr>
+            <a:normAutofit lnSpcReduction="10000"/>
+          </a:bodyPr>
+          <a:lstStyle/>
+          <a:p>
+            <a:pPr>
+              <a:buClr>
+                <a:schemeClr val="tx2">
+                  <a:lumMod val="75000"/>
+                </a:schemeClr>
+              </a:buClr>
+              <a:buFont typeface="Courier New" pitchFamily="49" charset="0"/>
+              <a:buChar char="o"/>
+            </a:pPr>
+            <a:r>
+              <a:rPr lang="bg-BG" dirty="0" smtClean="0"/>
+              <a:t>Професионален редактор (А. Янакиев)</a:t>
+            </a:r>
+          </a:p>
+          <a:p>
+            <a:pPr lvl="1">
+              <a:buClr>
+                <a:schemeClr val="tx2">
+                  <a:lumMod val="75000"/>
+                </a:schemeClr>
+              </a:buClr>
+              <a:buFont typeface="Courier New" pitchFamily="49" charset="0"/>
+              <a:buChar char="o"/>
+            </a:pPr>
+            <a:r>
+              <a:rPr lang="bg-BG" dirty="0" smtClean="0"/>
+              <a:t>трябва да се провери за </a:t>
+            </a:r>
+            <a:r>
+              <a:rPr lang="bg-BG" b="1" dirty="0" smtClean="0"/>
+              <a:t>цена на услугата</a:t>
+            </a:r>
+          </a:p>
+          <a:p>
+            <a:pPr lvl="1">
+              <a:buClr>
+                <a:schemeClr val="tx2">
+                  <a:lumMod val="75000"/>
+                </a:schemeClr>
+              </a:buClr>
+              <a:buFont typeface="Courier New" pitchFamily="49" charset="0"/>
+              <a:buChar char="o"/>
+            </a:pPr>
+            <a:r>
+              <a:rPr lang="bg-BG" dirty="0" smtClean="0"/>
+              <a:t>след намирането на спонсори</a:t>
+            </a:r>
+          </a:p>
+          <a:p>
+            <a:pPr>
+              <a:buClr>
+                <a:schemeClr val="tx2">
+                  <a:lumMod val="75000"/>
+                </a:schemeClr>
+              </a:buClr>
+              <a:buFont typeface="Courier New" pitchFamily="49" charset="0"/>
+              <a:buChar char="o"/>
+            </a:pPr>
+            <a:r>
+              <a:rPr lang="bg-BG" dirty="0" smtClean="0"/>
+              <a:t>Бъдещи сбирки </a:t>
+            </a:r>
+            <a:r>
+              <a:rPr lang="bg-BG" dirty="0"/>
+              <a:t>(Р. Тодоров)</a:t>
+            </a:r>
+            <a:endParaRPr lang="bg-BG" dirty="0" smtClean="0"/>
+          </a:p>
+          <a:p>
+            <a:pPr lvl="1">
+              <a:buClr>
+                <a:schemeClr val="tx2">
+                  <a:lumMod val="75000"/>
+                </a:schemeClr>
+              </a:buClr>
+              <a:buFont typeface="Courier New" pitchFamily="49" charset="0"/>
+              <a:buChar char="o"/>
+            </a:pPr>
+            <a:r>
+              <a:rPr lang="bg-BG" dirty="0" smtClean="0"/>
+              <a:t>физически или онлайн?</a:t>
+            </a:r>
+          </a:p>
+          <a:p>
+            <a:pPr lvl="1">
+              <a:buClr>
+                <a:schemeClr val="tx2">
+                  <a:lumMod val="75000"/>
+                </a:schemeClr>
+              </a:buClr>
+              <a:buFont typeface="Courier New" pitchFamily="49" charset="0"/>
+              <a:buChar char="o"/>
+            </a:pPr>
+            <a:r>
+              <a:rPr lang="bg-BG" dirty="0" smtClean="0"/>
+              <a:t>да се пусне </a:t>
+            </a:r>
+            <a:r>
+              <a:rPr lang="es-ES" dirty="0" err="1" smtClean="0"/>
+              <a:t>doodle</a:t>
+            </a:r>
+            <a:endParaRPr lang="en-GB" dirty="0" smtClean="0"/>
+          </a:p>
+          <a:p>
+            <a:pPr lvl="1">
+              <a:buClr>
+                <a:schemeClr val="tx2">
+                  <a:lumMod val="75000"/>
+                </a:schemeClr>
+              </a:buClr>
+              <a:buFont typeface="Courier New" pitchFamily="49" charset="0"/>
+              <a:buChar char="o"/>
+            </a:pPr>
+            <a:r>
+              <a:rPr lang="en-GB" dirty="0" smtClean="0"/>
+              <a:t>anymeeting.com</a:t>
+            </a:r>
+          </a:p>
+          <a:p>
+            <a:pPr lvl="1">
+              <a:buClr>
+                <a:schemeClr val="tx2">
+                  <a:lumMod val="75000"/>
+                </a:schemeClr>
+              </a:buClr>
+              <a:buFont typeface="Courier New" pitchFamily="49" charset="0"/>
+              <a:buChar char="o"/>
+            </a:pPr>
+            <a:r>
+              <a:rPr lang="en-GB" dirty="0" smtClean="0"/>
+              <a:t>gotomeeting.co.uk</a:t>
+            </a:r>
+            <a:endParaRPr lang="bg-BG" dirty="0" smtClean="0"/>
+          </a:p>
+          <a:p>
+            <a:pPr>
+              <a:buClr>
+                <a:schemeClr val="tx2">
+                  <a:lumMod val="75000"/>
+                </a:schemeClr>
+              </a:buClr>
+              <a:buFont typeface="Courier New" pitchFamily="49" charset="0"/>
+              <a:buChar char="o"/>
+            </a:pPr>
+            <a:r>
+              <a:rPr lang="bg-BG" dirty="0" smtClean="0"/>
+              <a:t>...</a:t>
+            </a:r>
+            <a:endParaRPr lang="en-GB" dirty="0"/>
+          </a:p>
+        </p:txBody>
+      </p:sp>
+      <p:sp>
+        <p:nvSpPr>
+          <p:cNvPr id="8" name="Round Diagonal Corner Rectangle 7"/>
+          <p:cNvSpPr/>
+          <p:nvPr/>
+        </p:nvSpPr>
+        <p:spPr>
+          <a:xfrm rot="10800000">
+            <a:off x="467544" y="260648"/>
+            <a:ext cx="8208912" cy="6264696"/>
+          </a:xfrm>
+          <a:prstGeom prst="round2DiagRect">
+            <a:avLst/>
+          </a:prstGeom>
+          <a:noFill/>
+          <a:ln>
+            <a:solidFill>
+              <a:schemeClr val="accent1">
+                <a:shade val="50000"/>
+              </a:schemeClr>
+            </a:solidFill>
+          </a:ln>
+          <a:effectLst>
+            <a:outerShdw blurRad="50800" dist="38100" dir="2700000" algn="tl" rotWithShape="0">
+              <a:prstClr val="black">
+                <a:alpha val="40000"/>
+              </a:prstClr>
+            </a:outerShdw>
+          </a:effectLst>
+        </p:spPr>
+        <p:style>
+          <a:lnRef idx="2">
+            <a:schemeClr val="accent1">
+              <a:shade val="50000"/>
+            </a:schemeClr>
+          </a:lnRef>
+          <a:fillRef idx="1">
+            <a:schemeClr val="accent1"/>
+          </a:fillRef>
+          <a:effectRef idx="0">
+            <a:schemeClr val="accent1"/>
+          </a:effectRef>
+          <a:fontRef idx="minor">
+            <a:schemeClr val="lt1"/>
+          </a:fontRef>
+        </p:style>
+        <p:txBody>
+          <a:bodyPr rtlCol="0" anchor="ctr"/>
+          <a:lstStyle/>
+          <a:p>
+            <a:pPr algn="ctr"/>
+            <a:endParaRPr lang="en-GB"/>
+          </a:p>
+        </p:txBody>
+      </p:sp>
+    </p:spTree>
+    <p:extLst>
+      <p:ext uri="{BB962C8B-B14F-4D97-AF65-F5344CB8AC3E}">
+        <p14:creationId xmlns:p14="http://schemas.microsoft.com/office/powerpoint/2010/main" val="459874832"/>
+      </p:ext>
+    </p:extLst>
+  </p:cSld>
+  <p:clrMapOvr>
+    <a:masterClrMapping/>
+  </p:clrMapOvr>
+  <p:timing>
+    <p:tnLst>
+      <p:par>
+        <p:cTn id="1" dur="indefinite" restart="never" nodeType="tmRoot"/>
+      </p:par>
+    </p:tnLst>
+  </p:timing>
+</p:sld>
+</file>
+
+<file path=ppt/slides/slide26.xml><?xml version="1.0" encoding="utf-8"?>
+<p:sld xmlns:a="http://schemas.openxmlformats.org/drawingml/2006/main" xmlns:r="http://schemas.openxmlformats.org/officeDocument/2006/relationships" xmlns:p="http://schemas.openxmlformats.org/presentationml/2006/main">
+  <p:cSld>
+    <p:spTree>
+      <p:nvGrpSpPr>
+        <p:cNvPr id="1" name=""/>
+        <p:cNvGrpSpPr/>
+        <p:nvPr/>
+      </p:nvGrpSpPr>
+      <p:grpSpPr>
+        <a:xfrm>
+          <a:off x="0" y="0"/>
+          <a:ext cx="0" cy="0"/>
+          <a:chOff x="0" y="0"/>
+          <a:chExt cx="0" cy="0"/>
+        </a:xfrm>
+      </p:grpSpPr>
+      <p:sp>
+        <p:nvSpPr>
+          <p:cNvPr id="2" name="Title 1"/>
+          <p:cNvSpPr>
+            <a:spLocks noGrp="1"/>
+          </p:cNvSpPr>
+          <p:nvPr>
+            <p:ph type="title"/>
+          </p:nvPr>
+        </p:nvSpPr>
+        <p:spPr/>
+        <p:txBody>
+          <a:bodyPr/>
+          <a:lstStyle/>
+          <a:p>
+            <a:r>
+              <a:rPr lang="bg-BG" dirty="0" smtClean="0"/>
+              <a:t>Дискусия </a:t>
+            </a:r>
+            <a:r>
+              <a:rPr lang="bg-BG" dirty="0" smtClean="0"/>
+              <a:t>(</a:t>
+            </a:r>
+            <a:r>
+              <a:rPr lang="en-US" dirty="0"/>
+              <a:t>5</a:t>
+            </a:r>
+            <a:r>
+              <a:rPr lang="bg-BG" dirty="0" smtClean="0"/>
+              <a:t>)</a:t>
+            </a:r>
+            <a:endParaRPr lang="en-GB" dirty="0"/>
+          </a:p>
+        </p:txBody>
+      </p:sp>
+      <p:sp>
+        <p:nvSpPr>
+          <p:cNvPr id="3" name="Content Placeholder 2"/>
+          <p:cNvSpPr>
+            <a:spLocks noGrp="1"/>
+          </p:cNvSpPr>
+          <p:nvPr>
+            <p:ph idx="1"/>
+          </p:nvPr>
+        </p:nvSpPr>
+        <p:spPr>
+          <a:xfrm>
+            <a:off x="683568" y="1600200"/>
+            <a:ext cx="8003232" cy="4525963"/>
+          </a:xfrm>
+        </p:spPr>
+        <p:txBody>
+          <a:bodyPr>
+            <a:normAutofit/>
+          </a:bodyPr>
+          <a:lstStyle/>
+          <a:p>
+            <a:pPr>
+              <a:buClr>
+                <a:schemeClr val="tx2">
+                  <a:lumMod val="75000"/>
+                </a:schemeClr>
+              </a:buClr>
+              <a:buFont typeface="Courier New" pitchFamily="49" charset="0"/>
+              <a:buChar char="o"/>
+            </a:pPr>
+            <a:r>
+              <a:rPr lang="bg-BG" dirty="0" smtClean="0"/>
+              <a:t>Структура на глави</a:t>
+            </a:r>
+          </a:p>
+          <a:p>
+            <a:pPr lvl="1">
+              <a:buClr>
+                <a:schemeClr val="tx2">
+                  <a:lumMod val="75000"/>
+                </a:schemeClr>
+              </a:buClr>
+              <a:buFont typeface="Courier New" pitchFamily="49" charset="0"/>
+              <a:buChar char="o"/>
+            </a:pPr>
+            <a:r>
+              <a:rPr lang="bg-BG" dirty="0" smtClean="0"/>
+              <a:t>подобна на тази на </a:t>
+            </a:r>
+            <a:r>
+              <a:rPr lang="es-ES" dirty="0" err="1" smtClean="0"/>
+              <a:t>GoF</a:t>
+            </a:r>
+            <a:endParaRPr lang="es-ES" dirty="0" smtClean="0"/>
+          </a:p>
+          <a:p>
+            <a:pPr lvl="1">
+              <a:buClr>
+                <a:schemeClr val="tx2">
+                  <a:lumMod val="75000"/>
+                </a:schemeClr>
+              </a:buClr>
+              <a:buFont typeface="Courier New" pitchFamily="49" charset="0"/>
+              <a:buChar char="o"/>
+            </a:pPr>
+            <a:r>
+              <a:rPr lang="bg-BG" dirty="0" smtClean="0"/>
+              <a:t>зададените точки в главите са минимума</a:t>
+            </a:r>
+          </a:p>
+          <a:p>
+            <a:pPr lvl="1">
+              <a:buClr>
+                <a:schemeClr val="tx2">
+                  <a:lumMod val="75000"/>
+                </a:schemeClr>
+              </a:buClr>
+              <a:buFont typeface="Courier New" pitchFamily="49" charset="0"/>
+              <a:buChar char="o"/>
+            </a:pPr>
+            <a:r>
+              <a:rPr lang="bg-BG" dirty="0" smtClean="0"/>
+              <a:t>няма ограничение за обема на съдържанието</a:t>
+            </a:r>
+            <a:endParaRPr lang="bg-BG" dirty="0" smtClean="0"/>
+          </a:p>
+          <a:p>
+            <a:pPr lvl="1">
+              <a:buClr>
+                <a:schemeClr val="tx2">
+                  <a:lumMod val="75000"/>
+                </a:schemeClr>
+              </a:buClr>
+              <a:buFont typeface="Courier New" pitchFamily="49" charset="0"/>
+              <a:buChar char="o"/>
+            </a:pPr>
+            <a:r>
+              <a:rPr lang="bg-BG" dirty="0" smtClean="0"/>
+              <a:t>авторите са свободни да </a:t>
+            </a:r>
+            <a:r>
+              <a:rPr lang="bg-BG" b="1" dirty="0" smtClean="0"/>
+              <a:t>добавят</a:t>
+            </a:r>
+            <a:r>
+              <a:rPr lang="bg-BG" dirty="0" smtClean="0"/>
+              <a:t> материя</a:t>
+            </a:r>
+          </a:p>
+          <a:p>
+            <a:pPr lvl="2">
+              <a:buClr>
+                <a:schemeClr val="tx2">
+                  <a:lumMod val="75000"/>
+                </a:schemeClr>
+              </a:buClr>
+              <a:buFont typeface="Courier New" pitchFamily="49" charset="0"/>
+              <a:buChar char="o"/>
+            </a:pPr>
+            <a:r>
+              <a:rPr lang="es-ES" b="1" dirty="0" err="1" smtClean="0"/>
+              <a:t>extention</a:t>
+            </a:r>
+            <a:r>
+              <a:rPr lang="es-ES" b="1" dirty="0" smtClean="0"/>
+              <a:t> </a:t>
+            </a:r>
+            <a:r>
+              <a:rPr lang="es-ES" b="1" dirty="0" err="1" smtClean="0"/>
+              <a:t>points</a:t>
+            </a:r>
+            <a:r>
+              <a:rPr lang="es-ES" b="1" dirty="0" smtClean="0"/>
+              <a:t> </a:t>
+            </a:r>
+            <a:r>
+              <a:rPr lang="en-US" b="1" dirty="0" smtClean="0"/>
+              <a:t>-&gt; [@author: </a:t>
+            </a:r>
+            <a:r>
+              <a:rPr lang="bg-BG" b="1" dirty="0" smtClean="0"/>
+              <a:t>други?</a:t>
+            </a:r>
+            <a:r>
+              <a:rPr lang="en-US" b="1" dirty="0" smtClean="0"/>
+              <a:t>]</a:t>
+            </a:r>
+            <a:r>
+              <a:rPr lang="bg-BG" b="1" smtClean="0"/>
+              <a:t> </a:t>
+            </a:r>
+            <a:r>
+              <a:rPr lang="bg-BG" b="1" smtClean="0">
+                <a:sym typeface="Wingdings" pitchFamily="2" charset="2"/>
+              </a:rPr>
+              <a:t></a:t>
+            </a:r>
+            <a:endParaRPr lang="es-ES" b="1" dirty="0" smtClean="0"/>
+          </a:p>
+          <a:p>
+            <a:pPr>
+              <a:buClr>
+                <a:schemeClr val="tx2">
+                  <a:lumMod val="75000"/>
+                </a:schemeClr>
+              </a:buClr>
+              <a:buFont typeface="Courier New" pitchFamily="49" charset="0"/>
+              <a:buChar char="o"/>
+            </a:pPr>
+            <a:r>
+              <a:rPr lang="bg-BG" dirty="0" smtClean="0"/>
+              <a:t>...</a:t>
+            </a:r>
+            <a:endParaRPr lang="en-GB" dirty="0"/>
+          </a:p>
+        </p:txBody>
+      </p:sp>
+      <p:sp>
+        <p:nvSpPr>
+          <p:cNvPr id="8" name="Round Diagonal Corner Rectangle 7"/>
+          <p:cNvSpPr/>
+          <p:nvPr/>
+        </p:nvSpPr>
+        <p:spPr>
+          <a:xfrm rot="10800000">
+            <a:off x="467544" y="260648"/>
+            <a:ext cx="8208912" cy="6264696"/>
+          </a:xfrm>
+          <a:prstGeom prst="round2DiagRect">
+            <a:avLst/>
+          </a:prstGeom>
+          <a:noFill/>
+          <a:ln>
+            <a:solidFill>
+              <a:schemeClr val="accent1">
+                <a:shade val="50000"/>
+              </a:schemeClr>
+            </a:solidFill>
+          </a:ln>
+          <a:effectLst>
+            <a:outerShdw blurRad="50800" dist="38100" dir="2700000" algn="tl" rotWithShape="0">
+              <a:prstClr val="black">
+                <a:alpha val="40000"/>
+              </a:prstClr>
+            </a:outerShdw>
+          </a:effectLst>
+        </p:spPr>
+        <p:style>
+          <a:lnRef idx="2">
+            <a:schemeClr val="accent1">
+              <a:shade val="50000"/>
+            </a:schemeClr>
+          </a:lnRef>
+          <a:fillRef idx="1">
+            <a:schemeClr val="accent1"/>
+          </a:fillRef>
+          <a:effectRef idx="0">
+            <a:schemeClr val="accent1"/>
+          </a:effectRef>
+          <a:fontRef idx="minor">
+            <a:schemeClr val="lt1"/>
+          </a:fontRef>
+        </p:style>
+        <p:txBody>
+          <a:bodyPr rtlCol="0" anchor="ctr"/>
+          <a:lstStyle/>
+          <a:p>
+            <a:pPr algn="ctr"/>
+            <a:endParaRPr lang="en-GB"/>
+          </a:p>
+        </p:txBody>
+      </p:sp>
+    </p:spTree>
+    <p:extLst>
+      <p:ext uri="{BB962C8B-B14F-4D97-AF65-F5344CB8AC3E}">
+        <p14:creationId xmlns:p14="http://schemas.microsoft.com/office/powerpoint/2010/main" val="1957383295"/>
+      </p:ext>
+    </p:extLst>
+  </p:cSld>
+  <p:clrMapOvr>
+    <a:masterClrMapping/>
+  </p:clrMapOvr>
+  <p:timing>
+    <p:tnLst>
+      <p:par>
+        <p:cTn id="1" dur="indefinite" restart="never" nodeType="tmRoot"/>
+      </p:par>
+    </p:tnLst>
+  </p:timing>
+</p:sld>
+</file>
+
+<file path=ppt/slides/slide27.xml><?xml version="1.0" encoding="utf-8"?>
 <p:sld xmlns:a="http://schemas.openxmlformats.org/drawingml/2006/main" xmlns:r="http://schemas.openxmlformats.org/officeDocument/2006/relationships" xmlns:p="http://schemas.openxmlformats.org/presentationml/2006/main">
   <p:cSld>
     <p:spTree>
@@ -16965,6 +18601,22 @@
               <a:rPr lang="bg-BG" dirty="0" smtClean="0"/>
               <a:t>Междинни проверки</a:t>
             </a:r>
+            <a:endParaRPr lang="en-US" dirty="0" smtClean="0"/>
+          </a:p>
+          <a:p>
+            <a:pPr lvl="1">
+              <a:buClr>
+                <a:schemeClr val="tx2">
+                  <a:lumMod val="75000"/>
+                </a:schemeClr>
+              </a:buClr>
+              <a:buFont typeface="Courier New" pitchFamily="49" charset="0"/>
+              <a:buChar char="o"/>
+            </a:pPr>
+            <a:r>
+              <a:rPr lang="bg-BG" dirty="0" smtClean="0"/>
+              <a:t>по електронна поща, а не група (А. Вакрилов)</a:t>
+            </a:r>
           </a:p>
           <a:p>
             <a:pPr>
@@ -17104,7 +18756,7 @@
           <a:p>
             <a:r>
               <a:rPr lang="bg-BG" dirty="0" smtClean="0"/>
-              <a:t>Започни с...</a:t>
+              <a:t>Започни с... (1)</a:t>
             </a:r>
             <a:endParaRPr lang="en-GB" dirty="0"/>
           </a:p>
@@ -17385,7 +19037,7 @@
           <a:p>
             <a:r>
               <a:rPr lang="bg-BG" dirty="0" smtClean="0"/>
-              <a:t>Организация</a:t>
+              <a:t>Започни с... (2)</a:t>
             </a:r>
             <a:endParaRPr lang="en-GB" dirty="0"/>
           </a:p>
@@ -17408,7 +19060,9 @@
           </a:xfrm>
         </p:spPr>
         <p:txBody>
-          <a:bodyPr/>
+          <a:bodyPr>
+            <a:normAutofit/>
+          </a:bodyPr>
           <a:lstStyle/>
           <a:p>
             <a:pPr>
@@ -17422,13 +19076,28 @@
             </a:pPr>
             <a:r>
               <a:rPr lang="bg-BG" dirty="0" smtClean="0"/>
-              <a:t>Нещо като </a:t>
-            </a:r>
-            <a:r>
-              <a:rPr lang="es-ES" dirty="0" err="1" smtClean="0"/>
-              <a:t>scrum</a:t>
-            </a:r>
-            <a:endParaRPr lang="es-ES" dirty="0" smtClean="0"/>
+              <a:t>След края на всяка итерация </a:t>
+            </a:r>
+          </a:p>
+          <a:p>
+            <a:pPr lvl="1">
+              <a:buClr>
+                <a:schemeClr val="tx2">
+                  <a:lumMod val="75000"/>
+                </a:schemeClr>
+              </a:buClr>
+              <a:buFont typeface="Courier New" pitchFamily="49" charset="0"/>
+              <a:buChar char="o"/>
+            </a:pPr>
+            <a:r>
+              <a:rPr lang="bg-BG" dirty="0" smtClean="0"/>
+              <a:t>резултатите да се публикуват в </a:t>
+            </a:r>
+            <a:r>
+              <a:rPr lang="es-ES" dirty="0" smtClean="0"/>
+              <a:t>wiki</a:t>
+            </a:r>
+            <a:endParaRPr lang="en-US" dirty="0" smtClean="0"/>
           </a:p>
           <a:p>
             <a:pPr>
@@ -17440,146 +19109,7 @@
               <a:buFont typeface="Courier New" pitchFamily="49" charset="0"/>
               <a:buChar char="o"/>
             </a:pPr>
-            <a:r>
-              <a:rPr lang="bg-BG" dirty="0" smtClean="0"/>
-              <a:t>Кратки итерации/етапи</a:t>
-            </a:r>
-          </a:p>
-          <a:p>
-            <a:pPr>
-              <a:buClr>
-                <a:schemeClr val="tx2">
-                  <a:lumMod val="75000"/>
-                </a:schemeClr>
-              </a:buClr>
-              <a:buFont typeface="Courier New" pitchFamily="49" charset="0"/>
-              <a:buChar char="o"/>
-            </a:pPr>
-            <a:r>
-              <a:rPr lang="bg-BG" dirty="0" smtClean="0"/>
-              <a:t>Чести междинни проверки</a:t>
-            </a:r>
-          </a:p>
-          <a:p>
-            <a:pPr lvl="1">
-              <a:buClr>
-                <a:schemeClr val="tx2">
-                  <a:lumMod val="75000"/>
-                </a:schemeClr>
-              </a:buClr>
-              <a:buFont typeface="Courier New" pitchFamily="49" charset="0"/>
-              <a:buChar char="o"/>
-            </a:pPr>
-            <a:r>
-              <a:rPr lang="es-ES" dirty="0" err="1" smtClean="0"/>
-              <a:t>Commit</a:t>
-            </a:r>
-            <a:r>
-              <a:rPr lang="es-ES" dirty="0" smtClean="0"/>
-              <a:t> </a:t>
-            </a:r>
-            <a:r>
-              <a:rPr lang="es-ES" dirty="0" err="1" smtClean="0"/>
-              <a:t>early</a:t>
-            </a:r>
-            <a:r>
-              <a:rPr lang="es-ES" dirty="0" smtClean="0"/>
-              <a:t>, </a:t>
-            </a:r>
-            <a:r>
-              <a:rPr lang="es-ES" dirty="0" err="1" smtClean="0"/>
-              <a:t>commit</a:t>
-            </a:r>
-            <a:r>
-              <a:rPr lang="es-ES" dirty="0" smtClean="0"/>
-              <a:t> </a:t>
-            </a:r>
-            <a:r>
-              <a:rPr lang="es-ES" dirty="0" err="1" smtClean="0"/>
-              <a:t>often</a:t>
-            </a:r>
-            <a:endParaRPr lang="bg-BG" dirty="0" smtClean="0"/>
-          </a:p>
-          <a:p>
-            <a:pPr>
-              <a:buClr>
-                <a:schemeClr val="tx2">
-                  <a:lumMod val="75000"/>
-                </a:schemeClr>
-              </a:buClr>
-              <a:buFont typeface="Courier New" pitchFamily="49" charset="0"/>
-              <a:buChar char="o"/>
-            </a:pPr>
-            <a:r>
-              <a:rPr lang="bg-BG" dirty="0" smtClean="0"/>
-              <a:t>Етапи</a:t>
-            </a:r>
-          </a:p>
-          <a:p>
-            <a:pPr lvl="1">
-              <a:buClr>
-                <a:schemeClr val="tx2">
-                  <a:lumMod val="75000"/>
-                </a:schemeClr>
-              </a:buClr>
-              <a:buFont typeface="Courier New" pitchFamily="49" charset="0"/>
-              <a:buChar char="o"/>
-            </a:pPr>
-            <a:r>
-              <a:rPr lang="bg-BG" dirty="0" smtClean="0"/>
-              <a:t>Писане (2</a:t>
-            </a:r>
-            <a:r>
-              <a:rPr lang="en-US" dirty="0" smtClean="0"/>
-              <a:t>n+1)</a:t>
-            </a:r>
-            <a:endParaRPr lang="bg-BG" dirty="0" smtClean="0"/>
-          </a:p>
-          <a:p>
-            <a:pPr lvl="1">
-              <a:buClr>
-                <a:schemeClr val="tx2">
-                  <a:lumMod val="75000"/>
-                </a:schemeClr>
-              </a:buClr>
-              <a:buFont typeface="Courier New" pitchFamily="49" charset="0"/>
-              <a:buChar char="o"/>
-            </a:pPr>
-            <a:r>
-              <a:rPr lang="bg-BG" dirty="0" smtClean="0"/>
-              <a:t>Редакция</a:t>
-            </a:r>
-            <a:r>
-              <a:rPr lang="en-US" dirty="0" smtClean="0"/>
-              <a:t> (2n)</a:t>
-            </a:r>
-          </a:p>
-          <a:p>
-            <a:pPr>
-              <a:buClr>
-                <a:schemeClr val="tx2">
-                  <a:lumMod val="75000"/>
-                </a:schemeClr>
-              </a:buClr>
-              <a:buFont typeface="Courier New" pitchFamily="49" charset="0"/>
-              <a:buChar char="o"/>
-            </a:pPr>
-            <a:r>
-              <a:rPr lang="bg-BG" dirty="0" smtClean="0"/>
-              <a:t>Организаторска редакция</a:t>
-            </a:r>
-          </a:p>
-          <a:p>
-            <a:pPr>
-              <a:buClr>
-                <a:schemeClr val="tx2">
-                  <a:lumMod val="75000"/>
-                </a:schemeClr>
-              </a:buClr>
-              <a:buFont typeface="Courier New" pitchFamily="49" charset="0"/>
-              <a:buChar char="o"/>
-            </a:pPr>
-            <a:endParaRPr lang="en-GB" dirty="0"/>
+            <a:endParaRPr lang="es-ES" dirty="0" smtClean="0"/>
           </a:p>
         </p:txBody>
       </p:sp>
@@ -17641,7 +19171,7 @@
     </p:spTree>
     <p:extLst>
       <p:ext uri="{BB962C8B-B14F-4D97-AF65-F5344CB8AC3E}">
-        <p14:creationId xmlns:p14="http://schemas.microsoft.com/office/powerpoint/2010/main" val="1675421750"/>
+        <p14:creationId xmlns:p14="http://schemas.microsoft.com/office/powerpoint/2010/main" val="3394234991"/>
       </p:ext>
     </p:extLst>
   </p:cSld>

</xml_diff>